<commit_message>
[ex2.] added 2.1 slides to pptx
</commit_message>
<xml_diff>
--- a/ex2/ex2_results.pptx
+++ b/ex2/ex2_results.pptx
@@ -1,15 +1,17 @@
 
 <file path=ppt/presentation.xml><?xml version="1.0" encoding="utf-8"?>
-<p:presentation xmlns:a="http://schemas.openxmlformats.org/drawingml/2006/main" xmlns:r="http://schemas.openxmlformats.org/officeDocument/2006/relationships" xmlns:p="http://schemas.openxmlformats.org/presentationml/2006/main" showSpecialPlsOnTitleSld="0" saveSubsetFonts="1">
+<p:presentation xmlns:a="http://schemas.openxmlformats.org/drawingml/2006/main" xmlns:r="http://schemas.openxmlformats.org/officeDocument/2006/relationships" xmlns:p="http://schemas.openxmlformats.org/presentationml/2006/main" firstSlideNum="0" showSpecialPlsOnTitleSld="0" saveSubsetFonts="1">
   <p:sldMasterIdLst>
     <p:sldMasterId id="2147483660" r:id="rId1"/>
   </p:sldMasterIdLst>
   <p:notesMasterIdLst>
-    <p:notesMasterId r:id="rId4"/>
+    <p:notesMasterId r:id="rId6"/>
   </p:notesMasterIdLst>
   <p:sldIdLst>
     <p:sldId id="266" r:id="rId2"/>
     <p:sldId id="263" r:id="rId3"/>
+    <p:sldId id="267" r:id="rId4"/>
+    <p:sldId id="268" r:id="rId5"/>
   </p:sldIdLst>
   <p:sldSz cx="9144000" cy="6858000" type="screen4x3"/>
   <p:notesSz cx="6858000" cy="9144000"/>
@@ -110,7 +112,7 @@
   </p:defaultTextStyle>
   <p:extLst>
     <p:ext uri="{EFAFB233-063F-42B5-8137-9DF3F51BA10A}">
-      <p15:sldGuideLst xmlns="" xmlns:p15="http://schemas.microsoft.com/office/powerpoint/2012/main"/>
+      <p15:sldGuideLst xmlns:p15="http://schemas.microsoft.com/office/powerpoint/2012/main" xmlns=""/>
     </p:ext>
   </p:extLst>
 </p:presentation>
@@ -536,7 +538,185 @@
           <a:p>
             <a:fld id="{66661D53-738D-4273-B7A0-3984D0D2E5B2}" type="slidenum">
               <a:rPr lang="de-DE" smtClean="0"/>
+              <a:t>1</a:t>
+            </a:fld>
+            <a:endParaRPr lang="de-DE"/>
+          </a:p>
+        </p:txBody>
+      </p:sp>
+    </p:spTree>
+    <p:extLst>
+      <p:ext uri="{BB962C8B-B14F-4D97-AF65-F5344CB8AC3E}">
+        <p14:creationId xmlns:p14="http://schemas.microsoft.com/office/powerpoint/2010/main" val="396126553"/>
+      </p:ext>
+    </p:extLst>
+  </p:cSld>
+  <p:clrMapOvr>
+    <a:masterClrMapping/>
+  </p:clrMapOvr>
+</p:notes>
+</file>
+
+<file path=ppt/notesSlides/notesSlide2.xml><?xml version="1.0" encoding="utf-8"?>
+<p:notes xmlns:a="http://schemas.openxmlformats.org/drawingml/2006/main" xmlns:r="http://schemas.openxmlformats.org/officeDocument/2006/relationships" xmlns:p="http://schemas.openxmlformats.org/presentationml/2006/main">
+  <p:cSld>
+    <p:spTree>
+      <p:nvGrpSpPr>
+        <p:cNvPr id="1" name=""/>
+        <p:cNvGrpSpPr/>
+        <p:nvPr/>
+      </p:nvGrpSpPr>
+      <p:grpSpPr>
+        <a:xfrm>
+          <a:off x="0" y="0"/>
+          <a:ext cx="0" cy="0"/>
+          <a:chOff x="0" y="0"/>
+          <a:chExt cx="0" cy="0"/>
+        </a:xfrm>
+      </p:grpSpPr>
+      <p:sp>
+        <p:nvSpPr>
+          <p:cNvPr id="2" name="Folienbildplatzhalter 1"/>
+          <p:cNvSpPr>
+            <a:spLocks noGrp="1" noRot="1" noChangeAspect="1"/>
+          </p:cNvSpPr>
+          <p:nvPr>
+            <p:ph type="sldImg"/>
+          </p:nvPr>
+        </p:nvSpPr>
+        <p:spPr>
+          <a:xfrm>
+            <a:off x="1371600" y="1143000"/>
+            <a:ext cx="4114800" cy="3086100"/>
+          </a:xfrm>
+        </p:spPr>
+      </p:sp>
+      <p:sp>
+        <p:nvSpPr>
+          <p:cNvPr id="3" name="Notizenplatzhalter 2"/>
+          <p:cNvSpPr>
+            <a:spLocks noGrp="1"/>
+          </p:cNvSpPr>
+          <p:nvPr>
+            <p:ph type="body" idx="1"/>
+          </p:nvPr>
+        </p:nvSpPr>
+        <p:spPr/>
+        <p:txBody>
+          <a:bodyPr/>
+          <a:lstStyle/>
+          <a:p>
+            <a:endParaRPr lang="de-DE"/>
+          </a:p>
+        </p:txBody>
+      </p:sp>
+      <p:sp>
+        <p:nvSpPr>
+          <p:cNvPr id="4" name="Foliennummernplatzhalter 3"/>
+          <p:cNvSpPr>
+            <a:spLocks noGrp="1"/>
+          </p:cNvSpPr>
+          <p:nvPr>
+            <p:ph type="sldNum" sz="quarter" idx="10"/>
+          </p:nvPr>
+        </p:nvSpPr>
+        <p:spPr/>
+        <p:txBody>
+          <a:bodyPr/>
+          <a:lstStyle/>
+          <a:p>
+            <a:fld id="{66661D53-738D-4273-B7A0-3984D0D2E5B2}" type="slidenum">
+              <a:rPr lang="de-DE" smtClean="0"/>
               <a:t>2</a:t>
+            </a:fld>
+            <a:endParaRPr lang="de-DE"/>
+          </a:p>
+        </p:txBody>
+      </p:sp>
+    </p:spTree>
+    <p:extLst>
+      <p:ext uri="{BB962C8B-B14F-4D97-AF65-F5344CB8AC3E}">
+        <p14:creationId xmlns:p14="http://schemas.microsoft.com/office/powerpoint/2010/main" val="396126553"/>
+      </p:ext>
+    </p:extLst>
+  </p:cSld>
+  <p:clrMapOvr>
+    <a:masterClrMapping/>
+  </p:clrMapOvr>
+</p:notes>
+</file>
+
+<file path=ppt/notesSlides/notesSlide3.xml><?xml version="1.0" encoding="utf-8"?>
+<p:notes xmlns:a="http://schemas.openxmlformats.org/drawingml/2006/main" xmlns:r="http://schemas.openxmlformats.org/officeDocument/2006/relationships" xmlns:p="http://schemas.openxmlformats.org/presentationml/2006/main">
+  <p:cSld>
+    <p:spTree>
+      <p:nvGrpSpPr>
+        <p:cNvPr id="1" name=""/>
+        <p:cNvGrpSpPr/>
+        <p:nvPr/>
+      </p:nvGrpSpPr>
+      <p:grpSpPr>
+        <a:xfrm>
+          <a:off x="0" y="0"/>
+          <a:ext cx="0" cy="0"/>
+          <a:chOff x="0" y="0"/>
+          <a:chExt cx="0" cy="0"/>
+        </a:xfrm>
+      </p:grpSpPr>
+      <p:sp>
+        <p:nvSpPr>
+          <p:cNvPr id="2" name="Folienbildplatzhalter 1"/>
+          <p:cNvSpPr>
+            <a:spLocks noGrp="1" noRot="1" noChangeAspect="1"/>
+          </p:cNvSpPr>
+          <p:nvPr>
+            <p:ph type="sldImg"/>
+          </p:nvPr>
+        </p:nvSpPr>
+        <p:spPr>
+          <a:xfrm>
+            <a:off x="1371600" y="1143000"/>
+            <a:ext cx="4114800" cy="3086100"/>
+          </a:xfrm>
+        </p:spPr>
+      </p:sp>
+      <p:sp>
+        <p:nvSpPr>
+          <p:cNvPr id="3" name="Notizenplatzhalter 2"/>
+          <p:cNvSpPr>
+            <a:spLocks noGrp="1"/>
+          </p:cNvSpPr>
+          <p:nvPr>
+            <p:ph type="body" idx="1"/>
+          </p:nvPr>
+        </p:nvSpPr>
+        <p:spPr/>
+        <p:txBody>
+          <a:bodyPr/>
+          <a:lstStyle/>
+          <a:p>
+            <a:endParaRPr lang="de-DE"/>
+          </a:p>
+        </p:txBody>
+      </p:sp>
+      <p:sp>
+        <p:nvSpPr>
+          <p:cNvPr id="4" name="Foliennummernplatzhalter 3"/>
+          <p:cNvSpPr>
+            <a:spLocks noGrp="1"/>
+          </p:cNvSpPr>
+          <p:nvPr>
+            <p:ph type="sldNum" sz="quarter" idx="10"/>
+          </p:nvPr>
+        </p:nvSpPr>
+        <p:spPr/>
+        <p:txBody>
+          <a:bodyPr/>
+          <a:lstStyle/>
+          <a:p>
+            <a:fld id="{66661D53-738D-4273-B7A0-3984D0D2E5B2}" type="slidenum">
+              <a:rPr lang="de-DE" smtClean="0"/>
+              <a:t>3</a:t>
             </a:fld>
             <a:endParaRPr lang="de-DE"/>
           </a:p>
@@ -3066,7 +3246,7 @@
     <p:sldLayoutId id="2147483670" r:id="rId10"/>
     <p:sldLayoutId id="2147483671" r:id="rId11"/>
   </p:sldLayoutIdLst>
-  <p:hf hdr="0"/>
+  <p:hf hdr="0" ftr="0" dt="0"/>
   <p:txStyles>
     <p:titleStyle>
       <a:lvl1pPr algn="l" defTabSz="914400" rtl="0" eaLnBrk="1" latinLnBrk="0" hangingPunct="1">
@@ -3391,11 +3571,7 @@
             </a:br>
             <a:r>
               <a:rPr lang="de-DE" dirty="0" smtClean="0"/>
-              <a:t>Übung </a:t>
-            </a:r>
-            <a:r>
-              <a:rPr lang="de-DE" dirty="0" smtClean="0"/>
-              <a:t>2</a:t>
+              <a:t>Übung 2</a:t>
             </a:r>
             <a:endParaRPr lang="de-DE" dirty="0"/>
           </a:p>
@@ -3652,67 +3828,6 @@
       </p:pic>
       <p:sp>
         <p:nvSpPr>
-          <p:cNvPr id="16" name="Datumsplatzhalter 15"/>
-          <p:cNvSpPr>
-            <a:spLocks noGrp="1"/>
-          </p:cNvSpPr>
-          <p:nvPr>
-            <p:ph type="dt" sz="half" idx="10"/>
-          </p:nvPr>
-        </p:nvSpPr>
-        <p:spPr/>
-        <p:txBody>
-          <a:bodyPr/>
-          <a:lstStyle/>
-          <a:p>
-            <a:endParaRPr lang="de-DE" dirty="0"/>
-          </a:p>
-        </p:txBody>
-      </p:sp>
-      <p:sp>
-        <p:nvSpPr>
-          <p:cNvPr id="17" name="Fußzeilenplatzhalter 16"/>
-          <p:cNvSpPr>
-            <a:spLocks noGrp="1"/>
-          </p:cNvSpPr>
-          <p:nvPr>
-            <p:ph type="ftr" sz="quarter" idx="11"/>
-          </p:nvPr>
-        </p:nvSpPr>
-        <p:spPr/>
-        <p:txBody>
-          <a:bodyPr/>
-          <a:lstStyle/>
-          <a:p>
-            <a:endParaRPr lang="de-DE" dirty="0"/>
-          </a:p>
-        </p:txBody>
-      </p:sp>
-      <p:sp>
-        <p:nvSpPr>
-          <p:cNvPr id="18" name="Foliennummernplatzhalter 17"/>
-          <p:cNvSpPr>
-            <a:spLocks noGrp="1"/>
-          </p:cNvSpPr>
-          <p:nvPr>
-            <p:ph type="sldNum" sz="quarter" idx="12"/>
-          </p:nvPr>
-        </p:nvSpPr>
-        <p:spPr/>
-        <p:txBody>
-          <a:bodyPr/>
-          <a:lstStyle/>
-          <a:p>
-            <a:r>
-              <a:rPr lang="de-DE" dirty="0" smtClean="0"/>
-              <a:t>1</a:t>
-            </a:r>
-            <a:endParaRPr lang="de-DE" dirty="0"/>
-          </a:p>
-        </p:txBody>
-      </p:sp>
-      <p:sp>
-        <p:nvSpPr>
           <p:cNvPr id="19" name="Line 23"/>
           <p:cNvSpPr>
             <a:spLocks noChangeShapeType="1"/>
@@ -3793,7 +3908,7 @@
             <p:spPr>
               <a:xfrm>
                 <a:off x="465512" y="1459724"/>
-                <a:ext cx="8212975" cy="2330895"/>
+                <a:ext cx="8212975" cy="5078313"/>
               </a:xfrm>
               <a:prstGeom prst="rect">
                 <a:avLst/>
@@ -3812,7 +3927,11 @@
                 </a:r>
                 <a:r>
                   <a:rPr lang="de-DE" dirty="0" smtClean="0"/>
-                  <a:t>Sprache von Texten anhand der vorkommenden Buchstaben-Paare und Buchstaben erkennen.</a:t>
+                  <a:t>Sprache von Texten anhand der vorkommenden Buchstaben-Paare und Buchstaben erkennen</a:t>
+                </a:r>
+                <a:r>
+                  <a:rPr lang="de-DE" dirty="0" smtClean="0"/>
+                  <a:t>. Dazu wird die Methode der kleinsten Quadrate verwendet.</a:t>
                 </a:r>
                 <a:endParaRPr lang="de-DE" dirty="0" smtClean="0"/>
               </a:p>
@@ -3826,7 +3945,11 @@
                 </a:r>
                 <a:r>
                   <a:rPr lang="de-DE" dirty="0" smtClean="0"/>
-                  <a:t>, Eingabe: Text </a:t>
+                  <a:t>, </a:t>
+                </a:r>
+                <a:r>
+                  <a:rPr lang="de-DE" dirty="0" smtClean="0"/>
+                  <a:t>Eingabe: Text </a:t>
                 </a:r>
                 <a14:m>
                   <m:oMath xmlns:m="http://schemas.openxmlformats.org/officeDocument/2006/math">
@@ -3894,7 +4017,80 @@
                 </a:pPr>
                 <a:r>
                   <a:rPr lang="de-DE" dirty="0" smtClean="0"/>
-                  <a:t>Berechne für jede Sprache </a:t>
+                  <a:t>Für jede Sprache </a:t>
+                </a:r>
+                <a14:m>
+                  <m:oMath xmlns:m="http://schemas.openxmlformats.org/officeDocument/2006/math">
+                    <m:r>
+                      <a:rPr lang="de-DE" b="0" i="1" dirty="0" smtClean="0">
+                        <a:latin typeface="Cambria Math"/>
+                      </a:rPr>
+                      <m:t>𝐿</m:t>
+                    </m:r>
+                    <m:r>
+                      <a:rPr lang="de-DE" b="0" i="1" dirty="0" smtClean="0">
+                        <a:latin typeface="Cambria Math"/>
+                        <a:ea typeface="Cambria Math"/>
+                      </a:rPr>
+                      <m:t>∈{</m:t>
+                    </m:r>
+                    <m:r>
+                      <a:rPr lang="de-DE" b="0" i="1" dirty="0" smtClean="0">
+                        <a:latin typeface="Cambria Math"/>
+                        <a:ea typeface="Cambria Math"/>
+                      </a:rPr>
+                      <m:t>𝑔𝑒𝑟</m:t>
+                    </m:r>
+                    <m:r>
+                      <a:rPr lang="de-DE" b="0" i="1" dirty="0" smtClean="0">
+                        <a:latin typeface="Cambria Math"/>
+                        <a:ea typeface="Cambria Math"/>
+                      </a:rPr>
+                      <m:t>, </m:t>
+                    </m:r>
+                    <m:r>
+                      <a:rPr lang="de-DE" b="0" i="1" dirty="0" smtClean="0">
+                        <a:latin typeface="Cambria Math"/>
+                        <a:ea typeface="Cambria Math"/>
+                      </a:rPr>
+                      <m:t>𝑒𝑛𝑔</m:t>
+                    </m:r>
+                    <m:r>
+                      <a:rPr lang="de-DE" b="0" i="1" dirty="0" smtClean="0">
+                        <a:latin typeface="Cambria Math"/>
+                        <a:ea typeface="Cambria Math"/>
+                      </a:rPr>
+                      <m:t>, </m:t>
+                    </m:r>
+                    <m:r>
+                      <a:rPr lang="de-DE" b="0" i="1" dirty="0" smtClean="0">
+                        <a:latin typeface="Cambria Math"/>
+                        <a:ea typeface="Cambria Math"/>
+                      </a:rPr>
+                      <m:t>𝑠𝑝𝑎</m:t>
+                    </m:r>
+                    <m:r>
+                      <a:rPr lang="de-DE" b="0" i="1" dirty="0" smtClean="0">
+                        <a:latin typeface="Cambria Math"/>
+                        <a:ea typeface="Cambria Math"/>
+                      </a:rPr>
+                      <m:t>}</m:t>
+                    </m:r>
+                  </m:oMath>
+                </a14:m>
+                <a:r>
+                  <a:rPr lang="de-DE" dirty="0" smtClean="0"/>
+                  <a:t>:</a:t>
+                </a:r>
+                <a:endParaRPr lang="de-DE" dirty="0" smtClean="0"/>
+              </a:p>
+              <a:p>
+                <a:pPr marL="342900" indent="-342900">
+                  <a:buAutoNum type="arabicPeriod"/>
+                </a:pPr>
+                <a:r>
+                  <a:rPr lang="de-DE" dirty="0" smtClean="0"/>
+                  <a:t>	Berechne für die </a:t>
                 </a:r>
                 <a14:m>
                   <m:oMath xmlns:m="http://schemas.openxmlformats.org/officeDocument/2006/math">
@@ -3902,13 +4098,13 @@
                       <a:rPr lang="de-DE" i="1" dirty="0" smtClean="0">
                         <a:latin typeface="Cambria Math"/>
                       </a:rPr>
-                      <m:t>𝑙𝑎𝑛𝑔</m:t>
+                      <m:t>𝑛</m:t>
                     </m:r>
                   </m:oMath>
                 </a14:m>
                 <a:r>
                   <a:rPr lang="de-DE" dirty="0" smtClean="0"/>
-                  <a:t> </a:t>
+                  <a:t> häufigsten Buchstaben bzw. Buchstabenpaare jeweils die 	Summe der quadratischen Fehler.</a:t>
                 </a:r>
               </a:p>
               <a:p>
@@ -3917,43 +4113,23 @@
                 </a:pPr>
                 <a:r>
                   <a:rPr lang="de-DE" dirty="0" smtClean="0"/>
-                  <a:t>für die n – häufigsten vorkommenden Buchstaben und Buchstabenpaare jeweils die Distanz:  </a:t>
+                  <a:t>Vergleiche die Summen der jeweiligen Sprachen. Die Sprache mit der niedrigsten Summe hat die geringste Abweichung und ist die vorhergesagte Sprache.</a:t>
+                </a:r>
+              </a:p>
+              <a:p>
+                <a:pPr marL="342900" indent="-342900">
+                  <a:buAutoNum type="arabicPeriod"/>
+                </a:pPr>
+                <a:r>
+                  <a:rPr lang="de-DE" dirty="0" smtClean="0"/>
+                  <a:t>Wenn die durchschnittliche Wortlänge &lt; 2 ist (mehr einzelne Buchstaben als Paare) gib die vorhergesagte Sprache der Buchstaben </a:t>
                 </a:r>
                 <a14:m>
                   <m:oMath xmlns:m="http://schemas.openxmlformats.org/officeDocument/2006/math">
-                    <m:r>
-                      <a:rPr lang="de-DE" b="0" i="1" smtClean="0">
-                        <a:latin typeface="Cambria Math"/>
-                      </a:rPr>
-                      <m:t>𝑑</m:t>
-                    </m:r>
-                    <m:d>
-                      <m:dPr>
-                        <m:ctrlPr>
-                          <a:rPr lang="de-DE" b="0" i="1" smtClean="0">
-                            <a:latin typeface="Cambria Math"/>
-                          </a:rPr>
-                        </m:ctrlPr>
-                      </m:dPr>
-                      <m:e>
-                        <m:r>
-                          <a:rPr lang="de-DE" b="0" i="1" smtClean="0">
-                            <a:latin typeface="Cambria Math"/>
-                          </a:rPr>
-                          <m:t>𝑥</m:t>
-                        </m:r>
-                      </m:e>
-                    </m:d>
-                    <m:r>
-                      <a:rPr lang="de-DE" b="0" i="1" smtClean="0">
-                        <a:latin typeface="Cambria Math"/>
-                      </a:rPr>
-                      <m:t>=</m:t>
-                    </m:r>
                     <m:sSub>
                       <m:sSubPr>
                         <m:ctrlPr>
-                          <a:rPr lang="de-DE" b="0" i="1" smtClean="0">
+                          <a:rPr lang="de-DE" i="1" smtClean="0">
                             <a:latin typeface="Cambria Math"/>
                           </a:rPr>
                         </m:ctrlPr>
@@ -3963,7 +4139,7 @@
                           <a:rPr lang="de-DE" b="0" i="1" smtClean="0">
                             <a:latin typeface="Cambria Math"/>
                           </a:rPr>
-                          <m:t>𝑜𝑐𝑐</m:t>
+                          <m:t>𝐿</m:t>
                         </m:r>
                       </m:e>
                       <m:sub>
@@ -3971,32 +4147,69 @@
                           <a:rPr lang="de-DE" b="0" i="1" smtClean="0">
                             <a:latin typeface="Cambria Math"/>
                           </a:rPr>
-                          <m:t>𝑡</m:t>
+                          <m:t>𝐶𝐻𝐴𝑅</m:t>
                         </m:r>
                       </m:sub>
                     </m:sSub>
+                  </m:oMath>
+                </a14:m>
+                <a:r>
+                  <a:rPr lang="de-DE" dirty="0" smtClean="0"/>
+                  <a:t> aus.</a:t>
+                </a:r>
+                <a:endParaRPr lang="de-DE" dirty="0" smtClean="0"/>
+              </a:p>
+              <a:p>
+                <a:pPr marL="342900" indent="-342900">
+                  <a:buAutoNum type="arabicPeriod"/>
+                </a:pPr>
+                <a:r>
+                  <a:rPr lang="de-DE" dirty="0" smtClean="0"/>
+                  <a:t>Wenn Buchstaben und Buchstabenpaare jeweils die gleiche Sprache </a:t>
+                </a:r>
+                <a14:m>
+                  <m:oMath xmlns:m="http://schemas.openxmlformats.org/officeDocument/2006/math">
                     <m:r>
-                      <a:rPr lang="de-DE" b="0" i="1" smtClean="0">
+                      <a:rPr lang="de-DE" i="1" dirty="0" smtClean="0">
                         <a:latin typeface="Cambria Math"/>
                       </a:rPr>
-                      <m:t>(</m:t>
+                      <m:t>𝐿</m:t>
                     </m:r>
+                  </m:oMath>
+                </a14:m>
+                <a:r>
+                  <a:rPr lang="de-DE" dirty="0" smtClean="0"/>
+                  <a:t> vorhersagen, gib </a:t>
+                </a:r>
+                <a14:m>
+                  <m:oMath xmlns:m="http://schemas.openxmlformats.org/officeDocument/2006/math">
                     <m:r>
-                      <a:rPr lang="de-DE" b="0" i="1" smtClean="0">
+                      <a:rPr lang="de-DE" i="1" dirty="0" smtClean="0">
                         <a:latin typeface="Cambria Math"/>
                       </a:rPr>
-                      <m:t>𝑥</m:t>
+                      <m:t>𝐿</m:t>
                     </m:r>
-                    <m:r>
-                      <a:rPr lang="de-DE" b="0" i="1" smtClean="0">
-                        <a:latin typeface="Cambria Math"/>
-                      </a:rPr>
-                      <m:t>)−</m:t>
-                    </m:r>
+                  </m:oMath>
+                </a14:m>
+                <a:r>
+                  <a:rPr lang="de-DE" dirty="0" smtClean="0"/>
+                  <a:t> aus.</a:t>
+                </a:r>
+              </a:p>
+              <a:p>
+                <a:pPr marL="342900" indent="-342900">
+                  <a:buAutoNum type="arabicPeriod"/>
+                </a:pPr>
+                <a:r>
+                  <a:rPr lang="de-DE" dirty="0" smtClean="0"/>
+                  <a:t>Wenn sich die Vorhersage Unterscheidet, gib die Sprache der Buchstabenpaare </a:t>
+                </a:r>
+                <a14:m>
+                  <m:oMath xmlns:m="http://schemas.openxmlformats.org/officeDocument/2006/math">
                     <m:sSub>
                       <m:sSubPr>
                         <m:ctrlPr>
-                          <a:rPr lang="de-DE" b="0" i="1" smtClean="0">
+                          <a:rPr lang="de-DE" i="1" smtClean="0">
                             <a:latin typeface="Cambria Math"/>
                           </a:rPr>
                         </m:ctrlPr>
@@ -4006,7 +4219,7 @@
                           <a:rPr lang="de-DE" b="0" i="1" smtClean="0">
                             <a:latin typeface="Cambria Math"/>
                           </a:rPr>
-                          <m:t>𝑜𝑐𝑐</m:t>
+                          <m:t>𝐿</m:t>
                         </m:r>
                       </m:e>
                       <m:sub>
@@ -4014,30 +4227,38 @@
                           <a:rPr lang="de-DE" b="0" i="1" smtClean="0">
                             <a:latin typeface="Cambria Math"/>
                           </a:rPr>
-                          <m:t>𝑙𝑎𝑛𝑔</m:t>
+                          <m:t>𝑃𝐴𝐼𝑅</m:t>
+                        </m:r>
+                        <m:r>
+                          <a:rPr lang="de-DE" b="0" i="1" smtClean="0">
+                            <a:latin typeface="Cambria Math"/>
+                          </a:rPr>
+                          <m:t> </m:t>
                         </m:r>
                       </m:sub>
                     </m:sSub>
-                    <m:r>
-                      <a:rPr lang="de-DE" b="0" i="1" smtClean="0">
-                        <a:latin typeface="Cambria Math"/>
-                      </a:rPr>
-                      <m:t>(</m:t>
-                    </m:r>
-                    <m:r>
-                      <a:rPr lang="de-DE" b="0" i="1" smtClean="0">
-                        <a:latin typeface="Cambria Math"/>
-                      </a:rPr>
-                      <m:t>𝑥</m:t>
-                    </m:r>
-                    <m:r>
-                      <a:rPr lang="de-DE" b="0" i="1" smtClean="0">
-                        <a:latin typeface="Cambria Math"/>
-                      </a:rPr>
-                      <m:t>)</m:t>
-                    </m:r>
                   </m:oMath>
                 </a14:m>
+                <a:r>
+                  <a:rPr lang="de-DE" dirty="0" smtClean="0"/>
+                  <a:t>aus. (</a:t>
+                </a:r>
+                <a:r>
+                  <a:rPr lang="de-DE" dirty="0" err="1" smtClean="0"/>
+                  <a:t>Bigramme</a:t>
+                </a:r>
+                <a:r>
+                  <a:rPr lang="de-DE" dirty="0" smtClean="0"/>
+                  <a:t> sind aussagekräftiger als Monogramme)</a:t>
+                </a:r>
+              </a:p>
+              <a:p>
+                <a:pPr marL="342900" indent="-342900">
+                  <a:buAutoNum type="arabicPeriod"/>
+                </a:pPr>
+                <a:endParaRPr lang="de-DE" dirty="0"/>
+              </a:p>
+              <a:p>
                 <a:endParaRPr lang="de-DE" dirty="0"/>
               </a:p>
             </p:txBody>
@@ -4055,7 +4276,7 @@
             <p:spPr>
               <a:xfrm>
                 <a:off x="465512" y="1459724"/>
-                <a:ext cx="8212975" cy="2330895"/>
+                <a:ext cx="8212975" cy="5078313"/>
               </a:xfrm>
               <a:prstGeom prst="rect">
                 <a:avLst/>
@@ -4063,7 +4284,7 @@
               <a:blipFill rotWithShape="1">
                 <a:blip r:embed="rId4"/>
                 <a:stretch>
-                  <a:fillRect l="-593" t="-1305" b="-2350"/>
+                  <a:fillRect l="-593" t="-600" r="-593"/>
                 </a:stretch>
               </a:blipFill>
             </p:spPr>
@@ -4082,10 +4303,842 @@
           </p:sp>
         </mc:Fallback>
       </mc:AlternateContent>
+      <p:sp>
+        <p:nvSpPr>
+          <p:cNvPr id="2" name="Foliennummernplatzhalter 1"/>
+          <p:cNvSpPr>
+            <a:spLocks noGrp="1"/>
+          </p:cNvSpPr>
+          <p:nvPr>
+            <p:ph type="sldNum" sz="quarter" idx="12"/>
+          </p:nvPr>
+        </p:nvSpPr>
+        <p:spPr/>
+        <p:txBody>
+          <a:bodyPr/>
+          <a:lstStyle/>
+          <a:p>
+            <a:fld id="{2330A4B3-4A2D-41F8-ABB6-3A93FC7C65B9}" type="slidenum">
+              <a:rPr lang="de-DE" smtClean="0"/>
+              <a:t>1</a:t>
+            </a:fld>
+            <a:endParaRPr lang="de-DE" dirty="0"/>
+          </a:p>
+        </p:txBody>
+      </p:sp>
     </p:spTree>
     <p:extLst>
       <p:ext uri="{BB962C8B-B14F-4D97-AF65-F5344CB8AC3E}">
         <p14:creationId xmlns:p14="http://schemas.microsoft.com/office/powerpoint/2010/main" val="1461809568"/>
+      </p:ext>
+    </p:extLst>
+  </p:cSld>
+  <p:clrMapOvr>
+    <a:masterClrMapping/>
+  </p:clrMapOvr>
+  <p:timing>
+    <p:tnLst>
+      <p:par>
+        <p:cTn id="1" dur="indefinite" restart="never" nodeType="tmRoot"/>
+      </p:par>
+    </p:tnLst>
+  </p:timing>
+</p:sld>
+</file>
+
+<file path=ppt/slides/slide3.xml><?xml version="1.0" encoding="utf-8"?>
+<p:sld xmlns:a="http://schemas.openxmlformats.org/drawingml/2006/main" xmlns:r="http://schemas.openxmlformats.org/officeDocument/2006/relationships" xmlns:p="http://schemas.openxmlformats.org/presentationml/2006/main">
+  <p:cSld>
+    <p:spTree>
+      <p:nvGrpSpPr>
+        <p:cNvPr id="1" name=""/>
+        <p:cNvGrpSpPr/>
+        <p:nvPr/>
+      </p:nvGrpSpPr>
+      <p:grpSpPr>
+        <a:xfrm>
+          <a:off x="0" y="0"/>
+          <a:ext cx="0" cy="0"/>
+          <a:chOff x="0" y="0"/>
+          <a:chExt cx="0" cy="0"/>
+        </a:xfrm>
+      </p:grpSpPr>
+      <p:sp>
+        <p:nvSpPr>
+          <p:cNvPr id="4" name="Rectangle 4"/>
+          <p:cNvSpPr>
+            <a:spLocks noChangeArrowheads="1"/>
+          </p:cNvSpPr>
+          <p:nvPr/>
+        </p:nvSpPr>
+        <p:spPr bwMode="auto">
+          <a:xfrm>
+            <a:off x="101600" y="82468"/>
+            <a:ext cx="8940800" cy="260603"/>
+          </a:xfrm>
+          <a:prstGeom prst="rect">
+            <a:avLst/>
+          </a:prstGeom>
+          <a:solidFill>
+            <a:srgbClr val="B90F22"/>
+          </a:solidFill>
+          <a:ln w="3175">
+            <a:noFill/>
+            <a:miter lim="800000"/>
+            <a:headEnd/>
+            <a:tailEnd/>
+          </a:ln>
+        </p:spPr>
+        <p:txBody>
+          <a:bodyPr/>
+          <a:lstStyle/>
+          <a:p>
+            <a:endParaRPr lang="de-DE" dirty="0"/>
+          </a:p>
+        </p:txBody>
+      </p:sp>
+      <p:sp>
+        <p:nvSpPr>
+          <p:cNvPr id="6" name="Line 23"/>
+          <p:cNvSpPr>
+            <a:spLocks noChangeShapeType="1"/>
+          </p:cNvSpPr>
+          <p:nvPr/>
+        </p:nvSpPr>
+        <p:spPr bwMode="auto">
+          <a:xfrm flipV="1">
+            <a:off x="101600" y="387521"/>
+            <a:ext cx="8940800" cy="0"/>
+          </a:xfrm>
+          <a:prstGeom prst="line">
+            <a:avLst/>
+          </a:prstGeom>
+          <a:noFill/>
+          <a:ln w="15240">
+            <a:solidFill>
+              <a:srgbClr val="000000"/>
+            </a:solidFill>
+            <a:round/>
+            <a:headEnd/>
+            <a:tailEnd/>
+          </a:ln>
+        </p:spPr>
+        <p:txBody>
+          <a:bodyPr/>
+          <a:lstStyle/>
+          <a:p>
+            <a:endParaRPr lang="de-DE" dirty="0"/>
+          </a:p>
+        </p:txBody>
+      </p:sp>
+      <p:sp>
+        <p:nvSpPr>
+          <p:cNvPr id="8" name="Line 28"/>
+          <p:cNvSpPr>
+            <a:spLocks noChangeShapeType="1"/>
+          </p:cNvSpPr>
+          <p:nvPr/>
+        </p:nvSpPr>
+        <p:spPr bwMode="auto">
+          <a:xfrm>
+            <a:off x="-984250" y="9967913"/>
+            <a:ext cx="6478588" cy="0"/>
+          </a:xfrm>
+          <a:prstGeom prst="line">
+            <a:avLst/>
+          </a:prstGeom>
+          <a:noFill/>
+          <a:ln w="7620">
+            <a:solidFill>
+              <a:srgbClr val="000000"/>
+            </a:solidFill>
+            <a:round/>
+            <a:headEnd/>
+            <a:tailEnd/>
+          </a:ln>
+        </p:spPr>
+        <p:txBody>
+          <a:bodyPr/>
+          <a:lstStyle/>
+          <a:p>
+            <a:endParaRPr lang="de-DE" dirty="0"/>
+          </a:p>
+        </p:txBody>
+      </p:sp>
+      <p:sp>
+        <p:nvSpPr>
+          <p:cNvPr id="14" name="Line 23"/>
+          <p:cNvSpPr>
+            <a:spLocks noChangeShapeType="1"/>
+          </p:cNvSpPr>
+          <p:nvPr/>
+        </p:nvSpPr>
+        <p:spPr bwMode="auto">
+          <a:xfrm flipV="1">
+            <a:off x="101600" y="6311899"/>
+            <a:ext cx="8940800" cy="1"/>
+          </a:xfrm>
+          <a:prstGeom prst="line">
+            <a:avLst/>
+          </a:prstGeom>
+          <a:noFill/>
+          <a:ln w="15240">
+            <a:solidFill>
+              <a:srgbClr val="000000"/>
+            </a:solidFill>
+            <a:round/>
+            <a:headEnd/>
+            <a:tailEnd/>
+          </a:ln>
+        </p:spPr>
+        <p:txBody>
+          <a:bodyPr/>
+          <a:lstStyle/>
+          <a:p>
+            <a:endParaRPr lang="de-DE" dirty="0"/>
+          </a:p>
+        </p:txBody>
+      </p:sp>
+      <p:pic>
+        <p:nvPicPr>
+          <p:cNvPr id="15" name="Picture 24" descr="tud_logo"/>
+          <p:cNvPicPr>
+            <a:picLocks noChangeAspect="1" noChangeArrowheads="1"/>
+          </p:cNvPicPr>
+          <p:nvPr/>
+        </p:nvPicPr>
+        <p:blipFill>
+          <a:blip r:embed="rId3" cstate="print"/>
+          <a:srcRect/>
+          <a:stretch>
+            <a:fillRect/>
+          </a:stretch>
+        </p:blipFill>
+        <p:spPr bwMode="auto">
+          <a:xfrm>
+            <a:off x="7162796" y="431972"/>
+            <a:ext cx="1981204" cy="792482"/>
+          </a:xfrm>
+          <a:prstGeom prst="rect">
+            <a:avLst/>
+          </a:prstGeom>
+          <a:noFill/>
+        </p:spPr>
+      </p:pic>
+      <p:sp>
+        <p:nvSpPr>
+          <p:cNvPr id="19" name="Line 23"/>
+          <p:cNvSpPr>
+            <a:spLocks noChangeShapeType="1"/>
+          </p:cNvSpPr>
+          <p:nvPr/>
+        </p:nvSpPr>
+        <p:spPr bwMode="auto">
+          <a:xfrm flipV="1">
+            <a:off x="101600" y="1313355"/>
+            <a:ext cx="8940800" cy="1"/>
+          </a:xfrm>
+          <a:prstGeom prst="line">
+            <a:avLst/>
+          </a:prstGeom>
+          <a:noFill/>
+          <a:ln w="9525">
+            <a:solidFill>
+              <a:schemeClr val="tx1">
+                <a:lumMod val="85000"/>
+                <a:lumOff val="15000"/>
+              </a:schemeClr>
+            </a:solidFill>
+            <a:round/>
+            <a:headEnd/>
+            <a:tailEnd/>
+          </a:ln>
+        </p:spPr>
+        <p:txBody>
+          <a:bodyPr/>
+          <a:lstStyle/>
+          <a:p>
+            <a:endParaRPr lang="de-DE" dirty="0"/>
+          </a:p>
+        </p:txBody>
+      </p:sp>
+      <p:sp>
+        <p:nvSpPr>
+          <p:cNvPr id="20" name="Textfeld 19"/>
+          <p:cNvSpPr txBox="1"/>
+          <p:nvPr/>
+        </p:nvSpPr>
+        <p:spPr>
+          <a:xfrm>
+            <a:off x="101600" y="621321"/>
+            <a:ext cx="7061196" cy="461665"/>
+          </a:xfrm>
+          <a:prstGeom prst="rect">
+            <a:avLst/>
+          </a:prstGeom>
+          <a:noFill/>
+        </p:spPr>
+        <p:txBody>
+          <a:bodyPr wrap="square" rtlCol="0">
+            <a:spAutoFit/>
+          </a:bodyPr>
+          <a:lstStyle/>
+          <a:p>
+            <a:r>
+              <a:rPr lang="de-DE" sz="2400" b="1" dirty="0" smtClean="0"/>
+              <a:t>Aufgabe 1</a:t>
+            </a:r>
+            <a:r>
+              <a:rPr lang="de-DE" dirty="0" smtClean="0"/>
+              <a:t> </a:t>
+            </a:r>
+            <a:endParaRPr lang="de-DE" dirty="0"/>
+          </a:p>
+        </p:txBody>
+      </p:sp>
+      <p:sp>
+        <p:nvSpPr>
+          <p:cNvPr id="2" name="Textfeld 1"/>
+          <p:cNvSpPr txBox="1"/>
+          <p:nvPr/>
+        </p:nvSpPr>
+        <p:spPr>
+          <a:xfrm>
+            <a:off x="3499207" y="1817726"/>
+            <a:ext cx="2065630" cy="3785652"/>
+          </a:xfrm>
+          <a:prstGeom prst="rect">
+            <a:avLst/>
+          </a:prstGeom>
+          <a:solidFill>
+            <a:schemeClr val="bg1">
+              <a:lumMod val="75000"/>
+            </a:schemeClr>
+          </a:solidFill>
+        </p:spPr>
+        <p:style>
+          <a:lnRef idx="2">
+            <a:schemeClr val="dk1"/>
+          </a:lnRef>
+          <a:fillRef idx="1">
+            <a:schemeClr val="lt1"/>
+          </a:fillRef>
+          <a:effectRef idx="0">
+            <a:schemeClr val="dk1"/>
+          </a:effectRef>
+          <a:fontRef idx="minor">
+            <a:schemeClr val="dk1"/>
+          </a:fontRef>
+        </p:style>
+        <p:txBody>
+          <a:bodyPr wrap="none" rtlCol="0">
+            <a:spAutoFit/>
+          </a:bodyPr>
+          <a:lstStyle/>
+          <a:p>
+            <a:r>
+              <a:rPr lang="en-US" sz="2400" dirty="0" smtClean="0"/>
+              <a:t>1	</a:t>
+            </a:r>
+            <a:r>
+              <a:rPr lang="en-US" sz="2400" dirty="0" err="1" smtClean="0"/>
+              <a:t>spanish</a:t>
+            </a:r>
+            <a:endParaRPr lang="en-US" sz="2400" dirty="0"/>
+          </a:p>
+          <a:p>
+            <a:r>
+              <a:rPr lang="en-US" sz="2400" dirty="0" smtClean="0"/>
+              <a:t>2	</a:t>
+            </a:r>
+            <a:r>
+              <a:rPr lang="en-US" sz="2400" dirty="0" err="1" smtClean="0"/>
+              <a:t>german</a:t>
+            </a:r>
+            <a:endParaRPr lang="en-US" sz="2400" dirty="0"/>
+          </a:p>
+          <a:p>
+            <a:r>
+              <a:rPr lang="en-US" sz="2400" dirty="0" smtClean="0"/>
+              <a:t>3	</a:t>
+            </a:r>
+            <a:r>
+              <a:rPr lang="en-US" sz="2400" dirty="0" err="1" smtClean="0"/>
+              <a:t>english</a:t>
+            </a:r>
+            <a:endParaRPr lang="en-US" sz="2400" dirty="0"/>
+          </a:p>
+          <a:p>
+            <a:r>
+              <a:rPr lang="en-US" sz="2400" dirty="0" smtClean="0"/>
+              <a:t>4	</a:t>
+            </a:r>
+            <a:r>
+              <a:rPr lang="en-US" sz="2400" dirty="0" err="1" smtClean="0"/>
+              <a:t>english</a:t>
+            </a:r>
+            <a:endParaRPr lang="en-US" sz="2400" dirty="0"/>
+          </a:p>
+          <a:p>
+            <a:r>
+              <a:rPr lang="en-US" sz="2400" dirty="0" smtClean="0"/>
+              <a:t>5	</a:t>
+            </a:r>
+            <a:r>
+              <a:rPr lang="en-US" sz="2400" dirty="0" err="1" smtClean="0"/>
+              <a:t>german</a:t>
+            </a:r>
+            <a:endParaRPr lang="en-US" sz="2400" dirty="0"/>
+          </a:p>
+          <a:p>
+            <a:r>
+              <a:rPr lang="en-US" sz="2400" dirty="0" smtClean="0"/>
+              <a:t>6	</a:t>
+            </a:r>
+            <a:r>
+              <a:rPr lang="en-US" sz="2400" dirty="0" err="1" smtClean="0"/>
+              <a:t>english</a:t>
+            </a:r>
+            <a:endParaRPr lang="en-US" sz="2400" dirty="0"/>
+          </a:p>
+          <a:p>
+            <a:r>
+              <a:rPr lang="en-US" sz="2400" dirty="0" smtClean="0"/>
+              <a:t>7	</a:t>
+            </a:r>
+            <a:r>
+              <a:rPr lang="en-US" sz="2400" dirty="0" err="1" smtClean="0"/>
+              <a:t>spanish</a:t>
+            </a:r>
+            <a:endParaRPr lang="en-US" sz="2400" dirty="0"/>
+          </a:p>
+          <a:p>
+            <a:r>
+              <a:rPr lang="en-US" sz="2400" dirty="0" smtClean="0"/>
+              <a:t>8	</a:t>
+            </a:r>
+            <a:r>
+              <a:rPr lang="en-US" sz="2400" dirty="0" err="1" smtClean="0"/>
+              <a:t>spanish</a:t>
+            </a:r>
+            <a:endParaRPr lang="en-US" sz="2400" dirty="0"/>
+          </a:p>
+          <a:p>
+            <a:r>
+              <a:rPr lang="en-US" sz="2400" dirty="0" smtClean="0"/>
+              <a:t>9	</a:t>
+            </a:r>
+            <a:r>
+              <a:rPr lang="en-US" sz="2400" dirty="0" err="1" smtClean="0"/>
+              <a:t>spanish</a:t>
+            </a:r>
+            <a:endParaRPr lang="en-US" sz="2400" dirty="0"/>
+          </a:p>
+          <a:p>
+            <a:r>
+              <a:rPr lang="en-US" sz="2400" dirty="0" smtClean="0"/>
+              <a:t>10	</a:t>
+            </a:r>
+            <a:r>
+              <a:rPr lang="en-US" sz="2400" dirty="0" err="1" smtClean="0"/>
+              <a:t>german</a:t>
+            </a:r>
+            <a:endParaRPr lang="en-US" sz="2400" dirty="0"/>
+          </a:p>
+        </p:txBody>
+      </p:sp>
+      <p:sp>
+        <p:nvSpPr>
+          <p:cNvPr id="7" name="Rechteck 6"/>
+          <p:cNvSpPr/>
+          <p:nvPr/>
+        </p:nvSpPr>
+        <p:spPr>
+          <a:xfrm>
+            <a:off x="3878412" y="5715783"/>
+            <a:ext cx="1412438" cy="369332"/>
+          </a:xfrm>
+          <a:prstGeom prst="rect">
+            <a:avLst/>
+          </a:prstGeom>
+        </p:spPr>
+        <p:txBody>
+          <a:bodyPr wrap="none">
+            <a:spAutoFit/>
+          </a:bodyPr>
+          <a:lstStyle/>
+          <a:p>
+            <a:r>
+              <a:rPr lang="de-DE" b="1" dirty="0"/>
+              <a:t>challenge.txt</a:t>
+            </a:r>
+            <a:endParaRPr lang="de-DE" b="1" dirty="0"/>
+          </a:p>
+        </p:txBody>
+      </p:sp>
+      <p:sp>
+        <p:nvSpPr>
+          <p:cNvPr id="9" name="Foliennummernplatzhalter 8"/>
+          <p:cNvSpPr>
+            <a:spLocks noGrp="1"/>
+          </p:cNvSpPr>
+          <p:nvPr>
+            <p:ph type="sldNum" sz="quarter" idx="12"/>
+          </p:nvPr>
+        </p:nvSpPr>
+        <p:spPr/>
+        <p:txBody>
+          <a:bodyPr/>
+          <a:lstStyle/>
+          <a:p>
+            <a:fld id="{2330A4B3-4A2D-41F8-ABB6-3A93FC7C65B9}" type="slidenum">
+              <a:rPr lang="de-DE" smtClean="0"/>
+              <a:t>2</a:t>
+            </a:fld>
+            <a:endParaRPr lang="de-DE" dirty="0"/>
+          </a:p>
+        </p:txBody>
+      </p:sp>
+    </p:spTree>
+    <p:extLst>
+      <p:ext uri="{BB962C8B-B14F-4D97-AF65-F5344CB8AC3E}">
+        <p14:creationId xmlns:p14="http://schemas.microsoft.com/office/powerpoint/2010/main" val="358765945"/>
+      </p:ext>
+    </p:extLst>
+  </p:cSld>
+  <p:clrMapOvr>
+    <a:masterClrMapping/>
+  </p:clrMapOvr>
+  <p:timing>
+    <p:tnLst>
+      <p:par>
+        <p:cTn id="1" dur="indefinite" restart="never" nodeType="tmRoot"/>
+      </p:par>
+    </p:tnLst>
+  </p:timing>
+</p:sld>
+</file>
+
+<file path=ppt/slides/slide4.xml><?xml version="1.0" encoding="utf-8"?>
+<p:sld xmlns:a="http://schemas.openxmlformats.org/drawingml/2006/main" xmlns:r="http://schemas.openxmlformats.org/officeDocument/2006/relationships" xmlns:p="http://schemas.openxmlformats.org/presentationml/2006/main">
+  <p:cSld>
+    <p:spTree>
+      <p:nvGrpSpPr>
+        <p:cNvPr id="1" name=""/>
+        <p:cNvGrpSpPr/>
+        <p:nvPr/>
+      </p:nvGrpSpPr>
+      <p:grpSpPr>
+        <a:xfrm>
+          <a:off x="0" y="0"/>
+          <a:ext cx="0" cy="0"/>
+          <a:chOff x="0" y="0"/>
+          <a:chExt cx="0" cy="0"/>
+        </a:xfrm>
+      </p:grpSpPr>
+      <p:sp>
+        <p:nvSpPr>
+          <p:cNvPr id="4" name="Rectangle 4"/>
+          <p:cNvSpPr>
+            <a:spLocks noChangeArrowheads="1"/>
+          </p:cNvSpPr>
+          <p:nvPr/>
+        </p:nvSpPr>
+        <p:spPr bwMode="auto">
+          <a:xfrm>
+            <a:off x="101600" y="82468"/>
+            <a:ext cx="8940800" cy="260603"/>
+          </a:xfrm>
+          <a:prstGeom prst="rect">
+            <a:avLst/>
+          </a:prstGeom>
+          <a:solidFill>
+            <a:srgbClr val="B90F22"/>
+          </a:solidFill>
+          <a:ln w="3175">
+            <a:noFill/>
+            <a:miter lim="800000"/>
+            <a:headEnd/>
+            <a:tailEnd/>
+          </a:ln>
+        </p:spPr>
+        <p:txBody>
+          <a:bodyPr/>
+          <a:lstStyle/>
+          <a:p>
+            <a:endParaRPr lang="de-DE" dirty="0"/>
+          </a:p>
+        </p:txBody>
+      </p:sp>
+      <p:sp>
+        <p:nvSpPr>
+          <p:cNvPr id="6" name="Line 23"/>
+          <p:cNvSpPr>
+            <a:spLocks noChangeShapeType="1"/>
+          </p:cNvSpPr>
+          <p:nvPr/>
+        </p:nvSpPr>
+        <p:spPr bwMode="auto">
+          <a:xfrm flipV="1">
+            <a:off x="101600" y="387521"/>
+            <a:ext cx="8940800" cy="0"/>
+          </a:xfrm>
+          <a:prstGeom prst="line">
+            <a:avLst/>
+          </a:prstGeom>
+          <a:noFill/>
+          <a:ln w="15240">
+            <a:solidFill>
+              <a:srgbClr val="000000"/>
+            </a:solidFill>
+            <a:round/>
+            <a:headEnd/>
+            <a:tailEnd/>
+          </a:ln>
+        </p:spPr>
+        <p:txBody>
+          <a:bodyPr/>
+          <a:lstStyle/>
+          <a:p>
+            <a:endParaRPr lang="de-DE" dirty="0"/>
+          </a:p>
+        </p:txBody>
+      </p:sp>
+      <p:sp>
+        <p:nvSpPr>
+          <p:cNvPr id="8" name="Line 28"/>
+          <p:cNvSpPr>
+            <a:spLocks noChangeShapeType="1"/>
+          </p:cNvSpPr>
+          <p:nvPr/>
+        </p:nvSpPr>
+        <p:spPr bwMode="auto">
+          <a:xfrm>
+            <a:off x="-984250" y="9967913"/>
+            <a:ext cx="6478588" cy="0"/>
+          </a:xfrm>
+          <a:prstGeom prst="line">
+            <a:avLst/>
+          </a:prstGeom>
+          <a:noFill/>
+          <a:ln w="7620">
+            <a:solidFill>
+              <a:srgbClr val="000000"/>
+            </a:solidFill>
+            <a:round/>
+            <a:headEnd/>
+            <a:tailEnd/>
+          </a:ln>
+        </p:spPr>
+        <p:txBody>
+          <a:bodyPr/>
+          <a:lstStyle/>
+          <a:p>
+            <a:endParaRPr lang="de-DE" dirty="0"/>
+          </a:p>
+        </p:txBody>
+      </p:sp>
+      <p:sp>
+        <p:nvSpPr>
+          <p:cNvPr id="14" name="Line 23"/>
+          <p:cNvSpPr>
+            <a:spLocks noChangeShapeType="1"/>
+          </p:cNvSpPr>
+          <p:nvPr/>
+        </p:nvSpPr>
+        <p:spPr bwMode="auto">
+          <a:xfrm flipV="1">
+            <a:off x="101600" y="6311899"/>
+            <a:ext cx="8940800" cy="1"/>
+          </a:xfrm>
+          <a:prstGeom prst="line">
+            <a:avLst/>
+          </a:prstGeom>
+          <a:noFill/>
+          <a:ln w="15240">
+            <a:solidFill>
+              <a:srgbClr val="000000"/>
+            </a:solidFill>
+            <a:round/>
+            <a:headEnd/>
+            <a:tailEnd/>
+          </a:ln>
+        </p:spPr>
+        <p:txBody>
+          <a:bodyPr/>
+          <a:lstStyle/>
+          <a:p>
+            <a:endParaRPr lang="de-DE" dirty="0"/>
+          </a:p>
+        </p:txBody>
+      </p:sp>
+      <p:pic>
+        <p:nvPicPr>
+          <p:cNvPr id="15" name="Picture 24" descr="tud_logo"/>
+          <p:cNvPicPr>
+            <a:picLocks noChangeAspect="1" noChangeArrowheads="1"/>
+          </p:cNvPicPr>
+          <p:nvPr/>
+        </p:nvPicPr>
+        <p:blipFill>
+          <a:blip r:embed="rId3" cstate="print"/>
+          <a:srcRect/>
+          <a:stretch>
+            <a:fillRect/>
+          </a:stretch>
+        </p:blipFill>
+        <p:spPr bwMode="auto">
+          <a:xfrm>
+            <a:off x="7162796" y="431972"/>
+            <a:ext cx="1981204" cy="792482"/>
+          </a:xfrm>
+          <a:prstGeom prst="rect">
+            <a:avLst/>
+          </a:prstGeom>
+          <a:noFill/>
+        </p:spPr>
+      </p:pic>
+      <p:sp>
+        <p:nvSpPr>
+          <p:cNvPr id="19" name="Line 23"/>
+          <p:cNvSpPr>
+            <a:spLocks noChangeShapeType="1"/>
+          </p:cNvSpPr>
+          <p:nvPr/>
+        </p:nvSpPr>
+        <p:spPr bwMode="auto">
+          <a:xfrm flipV="1">
+            <a:off x="101600" y="1313355"/>
+            <a:ext cx="8940800" cy="1"/>
+          </a:xfrm>
+          <a:prstGeom prst="line">
+            <a:avLst/>
+          </a:prstGeom>
+          <a:noFill/>
+          <a:ln w="9525">
+            <a:solidFill>
+              <a:schemeClr val="tx1">
+                <a:lumMod val="85000"/>
+                <a:lumOff val="15000"/>
+              </a:schemeClr>
+            </a:solidFill>
+            <a:round/>
+            <a:headEnd/>
+            <a:tailEnd/>
+          </a:ln>
+        </p:spPr>
+        <p:txBody>
+          <a:bodyPr/>
+          <a:lstStyle/>
+          <a:p>
+            <a:endParaRPr lang="de-DE" dirty="0"/>
+          </a:p>
+        </p:txBody>
+      </p:sp>
+      <p:sp>
+        <p:nvSpPr>
+          <p:cNvPr id="20" name="Textfeld 19"/>
+          <p:cNvSpPr txBox="1"/>
+          <p:nvPr/>
+        </p:nvSpPr>
+        <p:spPr>
+          <a:xfrm>
+            <a:off x="101600" y="621321"/>
+            <a:ext cx="7061196" cy="461665"/>
+          </a:xfrm>
+          <a:prstGeom prst="rect">
+            <a:avLst/>
+          </a:prstGeom>
+          <a:noFill/>
+        </p:spPr>
+        <p:txBody>
+          <a:bodyPr wrap="square" rtlCol="0">
+            <a:spAutoFit/>
+          </a:bodyPr>
+          <a:lstStyle/>
+          <a:p>
+            <a:r>
+              <a:rPr lang="de-DE" sz="2400" b="1" dirty="0" smtClean="0"/>
+              <a:t>Aufgabe </a:t>
+            </a:r>
+            <a:r>
+              <a:rPr lang="de-DE" sz="2400" b="1" dirty="0" smtClean="0"/>
+              <a:t>2</a:t>
+            </a:r>
+            <a:r>
+              <a:rPr lang="de-DE" dirty="0" smtClean="0"/>
+              <a:t> </a:t>
+            </a:r>
+            <a:endParaRPr lang="de-DE" dirty="0"/>
+          </a:p>
+        </p:txBody>
+      </p:sp>
+      <p:sp>
+        <p:nvSpPr>
+          <p:cNvPr id="3" name="Textfeld 2"/>
+          <p:cNvSpPr txBox="1"/>
+          <p:nvPr/>
+        </p:nvSpPr>
+        <p:spPr>
+          <a:xfrm>
+            <a:off x="465512" y="1459724"/>
+            <a:ext cx="8212975" cy="923330"/>
+          </a:xfrm>
+          <a:prstGeom prst="rect">
+            <a:avLst/>
+          </a:prstGeom>
+          <a:noFill/>
+        </p:spPr>
+        <p:txBody>
+          <a:bodyPr wrap="square" rtlCol="0">
+            <a:spAutoFit/>
+          </a:bodyPr>
+          <a:lstStyle/>
+          <a:p>
+            <a:r>
+              <a:rPr lang="de-DE" b="1" dirty="0" smtClean="0"/>
+              <a:t>TODO</a:t>
+            </a:r>
+            <a:endParaRPr lang="de-DE" dirty="0" smtClean="0"/>
+          </a:p>
+          <a:p>
+            <a:pPr marL="342900" indent="-342900">
+              <a:buAutoNum type="arabicPeriod"/>
+            </a:pPr>
+            <a:endParaRPr lang="de-DE" dirty="0"/>
+          </a:p>
+          <a:p>
+            <a:endParaRPr lang="de-DE" dirty="0"/>
+          </a:p>
+        </p:txBody>
+      </p:sp>
+      <p:sp>
+        <p:nvSpPr>
+          <p:cNvPr id="2" name="Foliennummernplatzhalter 1"/>
+          <p:cNvSpPr>
+            <a:spLocks noGrp="1"/>
+          </p:cNvSpPr>
+          <p:nvPr>
+            <p:ph type="sldNum" sz="quarter" idx="12"/>
+          </p:nvPr>
+        </p:nvSpPr>
+        <p:spPr/>
+        <p:txBody>
+          <a:bodyPr/>
+          <a:lstStyle/>
+          <a:p>
+            <a:fld id="{2330A4B3-4A2D-41F8-ABB6-3A93FC7C65B9}" type="slidenum">
+              <a:rPr lang="de-DE" smtClean="0"/>
+              <a:t>3</a:t>
+            </a:fld>
+            <a:endParaRPr lang="de-DE" dirty="0"/>
+          </a:p>
+        </p:txBody>
+      </p:sp>
+    </p:spTree>
+    <p:extLst>
+      <p:ext uri="{BB962C8B-B14F-4D97-AF65-F5344CB8AC3E}">
+        <p14:creationId xmlns:p14="http://schemas.microsoft.com/office/powerpoint/2010/main" val="1463417785"/>
       </p:ext>
     </p:extLst>
   </p:cSld>
@@ -4357,7 +5410,7 @@
   <a:extraClrSchemeLst/>
   <a:extLst>
     <a:ext uri="{05A4C25C-085E-4340-85A3-A5531E510DB2}">
-      <thm15:themeFamily xmlns="" xmlns:thm15="http://schemas.microsoft.com/office/thememl/2012/main" name="Office Theme" id="{62F939B6-93AF-4DB8-9C6B-D6C7DFDC589F}" vid="{4A3C46E8-61CC-4603-A589-7422A47A8E4A}"/>
+      <thm15:themeFamily xmlns:thm15="http://schemas.microsoft.com/office/thememl/2012/main" xmlns="" name="Office Theme" id="{62F939B6-93AF-4DB8-9C6B-D6C7DFDC589F}" vid="{4A3C46E8-61CC-4603-A589-7422A47A8E4A}"/>
     </a:ext>
   </a:extLst>
 </a:theme>
@@ -4618,7 +5671,7 @@
   <a:extraClrSchemeLst/>
   <a:extLst>
     <a:ext uri="{05A4C25C-085E-4340-85A3-A5531E510DB2}">
-      <thm15:themeFamily xmlns="" xmlns:thm15="http://schemas.microsoft.com/office/thememl/2012/main" name="Office Theme" id="{62F939B6-93AF-4DB8-9C6B-D6C7DFDC589F}" vid="{4A3C46E8-61CC-4603-A589-7422A47A8E4A}"/>
+      <thm15:themeFamily xmlns:thm15="http://schemas.microsoft.com/office/thememl/2012/main" xmlns="" name="Office Theme" id="{62F939B6-93AF-4DB8-9C6B-D6C7DFDC589F}" vid="{4A3C46E8-61CC-4603-A589-7422A47A8E4A}"/>
     </a:ext>
   </a:extLst>
 </a:theme>

</xml_diff>

<commit_message>
[ex2] added übung 4
</commit_message>
<xml_diff>
--- a/ex2/ex2_results.pptx
+++ b/ex2/ex2_results.pptx
@@ -5,13 +5,16 @@
     <p:sldMasterId id="2147483660" r:id="rId1"/>
   </p:sldMasterIdLst>
   <p:notesMasterIdLst>
-    <p:notesMasterId r:id="rId6"/>
+    <p:notesMasterId r:id="rId9"/>
   </p:notesMasterIdLst>
   <p:sldIdLst>
     <p:sldId id="266" r:id="rId2"/>
     <p:sldId id="263" r:id="rId3"/>
     <p:sldId id="267" r:id="rId4"/>
     <p:sldId id="268" r:id="rId5"/>
+    <p:sldId id="269" r:id="rId6"/>
+    <p:sldId id="270" r:id="rId7"/>
+    <p:sldId id="271" r:id="rId8"/>
   </p:sldIdLst>
   <p:sldSz cx="9144000" cy="6858000" type="screen4x3"/>
   <p:notesSz cx="6858000" cy="9144000"/>
@@ -200,7 +203,7 @@
           <a:p>
             <a:fld id="{BDF91827-DB47-4308-8B55-B709B19351C8}" type="datetimeFigureOut">
               <a:rPr lang="de-DE" smtClean="0"/>
-              <a:t>14.05.2015</a:t>
+              <a:t>23.05.2015</a:t>
             </a:fld>
             <a:endParaRPr lang="de-DE" dirty="0"/>
           </a:p>
@@ -717,6 +720,273 @@
             <a:fld id="{66661D53-738D-4273-B7A0-3984D0D2E5B2}" type="slidenum">
               <a:rPr lang="de-DE" smtClean="0"/>
               <a:t>3</a:t>
+            </a:fld>
+            <a:endParaRPr lang="de-DE"/>
+          </a:p>
+        </p:txBody>
+      </p:sp>
+    </p:spTree>
+    <p:extLst>
+      <p:ext uri="{BB962C8B-B14F-4D97-AF65-F5344CB8AC3E}">
+        <p14:creationId xmlns:p14="http://schemas.microsoft.com/office/powerpoint/2010/main" val="396126553"/>
+      </p:ext>
+    </p:extLst>
+  </p:cSld>
+  <p:clrMapOvr>
+    <a:masterClrMapping/>
+  </p:clrMapOvr>
+</p:notes>
+</file>
+
+<file path=ppt/notesSlides/notesSlide4.xml><?xml version="1.0" encoding="utf-8"?>
+<p:notes xmlns:a="http://schemas.openxmlformats.org/drawingml/2006/main" xmlns:r="http://schemas.openxmlformats.org/officeDocument/2006/relationships" xmlns:p="http://schemas.openxmlformats.org/presentationml/2006/main">
+  <p:cSld>
+    <p:spTree>
+      <p:nvGrpSpPr>
+        <p:cNvPr id="1" name=""/>
+        <p:cNvGrpSpPr/>
+        <p:nvPr/>
+      </p:nvGrpSpPr>
+      <p:grpSpPr>
+        <a:xfrm>
+          <a:off x="0" y="0"/>
+          <a:ext cx="0" cy="0"/>
+          <a:chOff x="0" y="0"/>
+          <a:chExt cx="0" cy="0"/>
+        </a:xfrm>
+      </p:grpSpPr>
+      <p:sp>
+        <p:nvSpPr>
+          <p:cNvPr id="2" name="Folienbildplatzhalter 1"/>
+          <p:cNvSpPr>
+            <a:spLocks noGrp="1" noRot="1" noChangeAspect="1"/>
+          </p:cNvSpPr>
+          <p:nvPr>
+            <p:ph type="sldImg"/>
+          </p:nvPr>
+        </p:nvSpPr>
+        <p:spPr>
+          <a:xfrm>
+            <a:off x="1371600" y="1143000"/>
+            <a:ext cx="4114800" cy="3086100"/>
+          </a:xfrm>
+        </p:spPr>
+      </p:sp>
+      <p:sp>
+        <p:nvSpPr>
+          <p:cNvPr id="3" name="Notizenplatzhalter 2"/>
+          <p:cNvSpPr>
+            <a:spLocks noGrp="1"/>
+          </p:cNvSpPr>
+          <p:nvPr>
+            <p:ph type="body" idx="1"/>
+          </p:nvPr>
+        </p:nvSpPr>
+        <p:spPr/>
+        <p:txBody>
+          <a:bodyPr/>
+          <a:lstStyle/>
+          <a:p>
+            <a:endParaRPr lang="de-DE"/>
+          </a:p>
+        </p:txBody>
+      </p:sp>
+      <p:sp>
+        <p:nvSpPr>
+          <p:cNvPr id="4" name="Foliennummernplatzhalter 3"/>
+          <p:cNvSpPr>
+            <a:spLocks noGrp="1"/>
+          </p:cNvSpPr>
+          <p:nvPr>
+            <p:ph type="sldNum" sz="quarter" idx="10"/>
+          </p:nvPr>
+        </p:nvSpPr>
+        <p:spPr/>
+        <p:txBody>
+          <a:bodyPr/>
+          <a:lstStyle/>
+          <a:p>
+            <a:fld id="{66661D53-738D-4273-B7A0-3984D0D2E5B2}" type="slidenum">
+              <a:rPr lang="de-DE" smtClean="0"/>
+              <a:t>4</a:t>
+            </a:fld>
+            <a:endParaRPr lang="de-DE"/>
+          </a:p>
+        </p:txBody>
+      </p:sp>
+    </p:spTree>
+    <p:extLst>
+      <p:ext uri="{BB962C8B-B14F-4D97-AF65-F5344CB8AC3E}">
+        <p14:creationId xmlns:p14="http://schemas.microsoft.com/office/powerpoint/2010/main" val="396126553"/>
+      </p:ext>
+    </p:extLst>
+  </p:cSld>
+  <p:clrMapOvr>
+    <a:masterClrMapping/>
+  </p:clrMapOvr>
+</p:notes>
+</file>
+
+<file path=ppt/notesSlides/notesSlide5.xml><?xml version="1.0" encoding="utf-8"?>
+<p:notes xmlns:a="http://schemas.openxmlformats.org/drawingml/2006/main" xmlns:r="http://schemas.openxmlformats.org/officeDocument/2006/relationships" xmlns:p="http://schemas.openxmlformats.org/presentationml/2006/main">
+  <p:cSld>
+    <p:spTree>
+      <p:nvGrpSpPr>
+        <p:cNvPr id="1" name=""/>
+        <p:cNvGrpSpPr/>
+        <p:nvPr/>
+      </p:nvGrpSpPr>
+      <p:grpSpPr>
+        <a:xfrm>
+          <a:off x="0" y="0"/>
+          <a:ext cx="0" cy="0"/>
+          <a:chOff x="0" y="0"/>
+          <a:chExt cx="0" cy="0"/>
+        </a:xfrm>
+      </p:grpSpPr>
+      <p:sp>
+        <p:nvSpPr>
+          <p:cNvPr id="2" name="Folienbildplatzhalter 1"/>
+          <p:cNvSpPr>
+            <a:spLocks noGrp="1" noRot="1" noChangeAspect="1"/>
+          </p:cNvSpPr>
+          <p:nvPr>
+            <p:ph type="sldImg"/>
+          </p:nvPr>
+        </p:nvSpPr>
+        <p:spPr>
+          <a:xfrm>
+            <a:off x="1371600" y="1143000"/>
+            <a:ext cx="4114800" cy="3086100"/>
+          </a:xfrm>
+        </p:spPr>
+      </p:sp>
+      <p:sp>
+        <p:nvSpPr>
+          <p:cNvPr id="3" name="Notizenplatzhalter 2"/>
+          <p:cNvSpPr>
+            <a:spLocks noGrp="1"/>
+          </p:cNvSpPr>
+          <p:nvPr>
+            <p:ph type="body" idx="1"/>
+          </p:nvPr>
+        </p:nvSpPr>
+        <p:spPr/>
+        <p:txBody>
+          <a:bodyPr/>
+          <a:lstStyle/>
+          <a:p>
+            <a:endParaRPr lang="de-DE"/>
+          </a:p>
+        </p:txBody>
+      </p:sp>
+      <p:sp>
+        <p:nvSpPr>
+          <p:cNvPr id="4" name="Foliennummernplatzhalter 3"/>
+          <p:cNvSpPr>
+            <a:spLocks noGrp="1"/>
+          </p:cNvSpPr>
+          <p:nvPr>
+            <p:ph type="sldNum" sz="quarter" idx="10"/>
+          </p:nvPr>
+        </p:nvSpPr>
+        <p:spPr/>
+        <p:txBody>
+          <a:bodyPr/>
+          <a:lstStyle/>
+          <a:p>
+            <a:fld id="{66661D53-738D-4273-B7A0-3984D0D2E5B2}" type="slidenum">
+              <a:rPr lang="de-DE" smtClean="0"/>
+              <a:t>5</a:t>
+            </a:fld>
+            <a:endParaRPr lang="de-DE"/>
+          </a:p>
+        </p:txBody>
+      </p:sp>
+    </p:spTree>
+    <p:extLst>
+      <p:ext uri="{BB962C8B-B14F-4D97-AF65-F5344CB8AC3E}">
+        <p14:creationId xmlns:p14="http://schemas.microsoft.com/office/powerpoint/2010/main" val="396126553"/>
+      </p:ext>
+    </p:extLst>
+  </p:cSld>
+  <p:clrMapOvr>
+    <a:masterClrMapping/>
+  </p:clrMapOvr>
+</p:notes>
+</file>
+
+<file path=ppt/notesSlides/notesSlide6.xml><?xml version="1.0" encoding="utf-8"?>
+<p:notes xmlns:a="http://schemas.openxmlformats.org/drawingml/2006/main" xmlns:r="http://schemas.openxmlformats.org/officeDocument/2006/relationships" xmlns:p="http://schemas.openxmlformats.org/presentationml/2006/main">
+  <p:cSld>
+    <p:spTree>
+      <p:nvGrpSpPr>
+        <p:cNvPr id="1" name=""/>
+        <p:cNvGrpSpPr/>
+        <p:nvPr/>
+      </p:nvGrpSpPr>
+      <p:grpSpPr>
+        <a:xfrm>
+          <a:off x="0" y="0"/>
+          <a:ext cx="0" cy="0"/>
+          <a:chOff x="0" y="0"/>
+          <a:chExt cx="0" cy="0"/>
+        </a:xfrm>
+      </p:grpSpPr>
+      <p:sp>
+        <p:nvSpPr>
+          <p:cNvPr id="2" name="Folienbildplatzhalter 1"/>
+          <p:cNvSpPr>
+            <a:spLocks noGrp="1" noRot="1" noChangeAspect="1"/>
+          </p:cNvSpPr>
+          <p:nvPr>
+            <p:ph type="sldImg"/>
+          </p:nvPr>
+        </p:nvSpPr>
+        <p:spPr>
+          <a:xfrm>
+            <a:off x="1371600" y="1143000"/>
+            <a:ext cx="4114800" cy="3086100"/>
+          </a:xfrm>
+        </p:spPr>
+      </p:sp>
+      <p:sp>
+        <p:nvSpPr>
+          <p:cNvPr id="3" name="Notizenplatzhalter 2"/>
+          <p:cNvSpPr>
+            <a:spLocks noGrp="1"/>
+          </p:cNvSpPr>
+          <p:nvPr>
+            <p:ph type="body" idx="1"/>
+          </p:nvPr>
+        </p:nvSpPr>
+        <p:spPr/>
+        <p:txBody>
+          <a:bodyPr/>
+          <a:lstStyle/>
+          <a:p>
+            <a:endParaRPr lang="de-DE"/>
+          </a:p>
+        </p:txBody>
+      </p:sp>
+      <p:sp>
+        <p:nvSpPr>
+          <p:cNvPr id="4" name="Foliennummernplatzhalter 3"/>
+          <p:cNvSpPr>
+            <a:spLocks noGrp="1"/>
+          </p:cNvSpPr>
+          <p:nvPr>
+            <p:ph type="sldNum" sz="quarter" idx="10"/>
+          </p:nvPr>
+        </p:nvSpPr>
+        <p:spPr/>
+        <p:txBody>
+          <a:bodyPr/>
+          <a:lstStyle/>
+          <a:p>
+            <a:fld id="{66661D53-738D-4273-B7A0-3984D0D2E5B2}" type="slidenum">
+              <a:rPr lang="de-DE" smtClean="0"/>
+              <a:t>6</a:t>
             </a:fld>
             <a:endParaRPr lang="de-DE"/>
           </a:p>
@@ -3897,8 +4167,8 @@
           </a:p>
         </p:txBody>
       </p:sp>
-      <mc:AlternateContent xmlns:mc="http://schemas.openxmlformats.org/markup-compatibility/2006">
-        <mc:Choice xmlns:a14="http://schemas.microsoft.com/office/drawing/2010/main" Requires="a14">
+      <mc:AlternateContent xmlns:mc="http://schemas.openxmlformats.org/markup-compatibility/2006" xmlns:a14="http://schemas.microsoft.com/office/drawing/2010/main">
+        <mc:Choice Requires="a14">
           <p:sp>
             <p:nvSpPr>
               <p:cNvPr id="3" name="Textfeld 2"/>
@@ -3927,13 +4197,8 @@
                 </a:r>
                 <a:r>
                   <a:rPr lang="de-DE" dirty="0" smtClean="0"/>
-                  <a:t>Sprache von Texten anhand der vorkommenden Buchstaben-Paare und Buchstaben erkennen</a:t>
+                  <a:t>Sprache von Texten anhand der vorkommenden Buchstaben-Paare und Buchstaben erkennen. Dazu wird die Methode der kleinsten Quadrate verwendet.</a:t>
                 </a:r>
-                <a:r>
-                  <a:rPr lang="de-DE" dirty="0" smtClean="0"/>
-                  <a:t>. Dazu wird die Methode der kleinsten Quadrate verwendet.</a:t>
-                </a:r>
-                <a:endParaRPr lang="de-DE" dirty="0" smtClean="0"/>
               </a:p>
               <a:p>
                 <a:endParaRPr lang="de-DE" dirty="0"/>
@@ -3945,11 +4210,7 @@
                 </a:r>
                 <a:r>
                   <a:rPr lang="de-DE" dirty="0" smtClean="0"/>
-                  <a:t>, </a:t>
-                </a:r>
-                <a:r>
-                  <a:rPr lang="de-DE" dirty="0" smtClean="0"/>
-                  <a:t>Eingabe: Text </a:t>
+                  <a:t>, Eingabe: Text </a:t>
                 </a:r>
                 <a14:m>
                   <m:oMath xmlns:m="http://schemas.openxmlformats.org/officeDocument/2006/math">
@@ -4082,7 +4343,6 @@
                   <a:rPr lang="de-DE" dirty="0" smtClean="0"/>
                   <a:t>:</a:t>
                 </a:r>
-                <a:endParaRPr lang="de-DE" dirty="0" smtClean="0"/>
               </a:p>
               <a:p>
                 <a:pPr marL="342900" indent="-342900">
@@ -4157,7 +4417,6 @@
                   <a:rPr lang="de-DE" dirty="0" smtClean="0"/>
                   <a:t> aus.</a:t>
                 </a:r>
-                <a:endParaRPr lang="de-DE" dirty="0" smtClean="0"/>
               </a:p>
               <a:p>
                 <a:pPr marL="342900" indent="-342900">
@@ -4264,7 +4523,7 @@
             </p:txBody>
           </p:sp>
         </mc:Choice>
-        <mc:Fallback>
+        <mc:Fallback xmlns="">
           <p:sp>
             <p:nvSpPr>
               <p:cNvPr id="3" name="Textfeld 2"/>
@@ -4772,7 +5031,6 @@
               <a:rPr lang="de-DE" b="1" dirty="0"/>
               <a:t>challenge.txt</a:t>
             </a:r>
-            <a:endParaRPr lang="de-DE" b="1" dirty="0"/>
           </a:p>
         </p:txBody>
       </p:sp>
@@ -5059,11 +5317,7 @@
           <a:p>
             <a:r>
               <a:rPr lang="de-DE" sz="2400" b="1" dirty="0" smtClean="0"/>
-              <a:t>Aufgabe </a:t>
-            </a:r>
-            <a:r>
-              <a:rPr lang="de-DE" sz="2400" b="1" dirty="0" smtClean="0"/>
-              <a:t>2</a:t>
+              <a:t>Aufgabe 2</a:t>
             </a:r>
             <a:r>
               <a:rPr lang="de-DE" dirty="0" smtClean="0"/>
@@ -5139,6 +5393,1926 @@
     <p:extLst>
       <p:ext uri="{BB962C8B-B14F-4D97-AF65-F5344CB8AC3E}">
         <p14:creationId xmlns:p14="http://schemas.microsoft.com/office/powerpoint/2010/main" val="1463417785"/>
+      </p:ext>
+    </p:extLst>
+  </p:cSld>
+  <p:clrMapOvr>
+    <a:masterClrMapping/>
+  </p:clrMapOvr>
+  <p:timing>
+    <p:tnLst>
+      <p:par>
+        <p:cTn id="1" dur="indefinite" restart="never" nodeType="tmRoot"/>
+      </p:par>
+    </p:tnLst>
+  </p:timing>
+</p:sld>
+</file>
+
+<file path=ppt/slides/slide5.xml><?xml version="1.0" encoding="utf-8"?>
+<p:sld xmlns:a="http://schemas.openxmlformats.org/drawingml/2006/main" xmlns:r="http://schemas.openxmlformats.org/officeDocument/2006/relationships" xmlns:p="http://schemas.openxmlformats.org/presentationml/2006/main">
+  <p:cSld>
+    <p:spTree>
+      <p:nvGrpSpPr>
+        <p:cNvPr id="1" name=""/>
+        <p:cNvGrpSpPr/>
+        <p:nvPr/>
+      </p:nvGrpSpPr>
+      <p:grpSpPr>
+        <a:xfrm>
+          <a:off x="0" y="0"/>
+          <a:ext cx="0" cy="0"/>
+          <a:chOff x="0" y="0"/>
+          <a:chExt cx="0" cy="0"/>
+        </a:xfrm>
+      </p:grpSpPr>
+      <p:sp>
+        <p:nvSpPr>
+          <p:cNvPr id="4" name="Rectangle 4"/>
+          <p:cNvSpPr>
+            <a:spLocks noChangeArrowheads="1"/>
+          </p:cNvSpPr>
+          <p:nvPr/>
+        </p:nvSpPr>
+        <p:spPr bwMode="auto">
+          <a:xfrm>
+            <a:off x="101600" y="82468"/>
+            <a:ext cx="8940800" cy="260603"/>
+          </a:xfrm>
+          <a:prstGeom prst="rect">
+            <a:avLst/>
+          </a:prstGeom>
+          <a:solidFill>
+            <a:srgbClr val="B90F22"/>
+          </a:solidFill>
+          <a:ln w="3175">
+            <a:noFill/>
+            <a:miter lim="800000"/>
+            <a:headEnd/>
+            <a:tailEnd/>
+          </a:ln>
+        </p:spPr>
+        <p:txBody>
+          <a:bodyPr/>
+          <a:lstStyle/>
+          <a:p>
+            <a:endParaRPr lang="de-DE" dirty="0"/>
+          </a:p>
+        </p:txBody>
+      </p:sp>
+      <p:sp>
+        <p:nvSpPr>
+          <p:cNvPr id="6" name="Line 23"/>
+          <p:cNvSpPr>
+            <a:spLocks noChangeShapeType="1"/>
+          </p:cNvSpPr>
+          <p:nvPr/>
+        </p:nvSpPr>
+        <p:spPr bwMode="auto">
+          <a:xfrm flipV="1">
+            <a:off x="101600" y="387521"/>
+            <a:ext cx="8940800" cy="0"/>
+          </a:xfrm>
+          <a:prstGeom prst="line">
+            <a:avLst/>
+          </a:prstGeom>
+          <a:noFill/>
+          <a:ln w="15240">
+            <a:solidFill>
+              <a:srgbClr val="000000"/>
+            </a:solidFill>
+            <a:round/>
+            <a:headEnd/>
+            <a:tailEnd/>
+          </a:ln>
+        </p:spPr>
+        <p:txBody>
+          <a:bodyPr/>
+          <a:lstStyle/>
+          <a:p>
+            <a:endParaRPr lang="de-DE" dirty="0"/>
+          </a:p>
+        </p:txBody>
+      </p:sp>
+      <p:sp>
+        <p:nvSpPr>
+          <p:cNvPr id="8" name="Line 28"/>
+          <p:cNvSpPr>
+            <a:spLocks noChangeShapeType="1"/>
+          </p:cNvSpPr>
+          <p:nvPr/>
+        </p:nvSpPr>
+        <p:spPr bwMode="auto">
+          <a:xfrm>
+            <a:off x="-984250" y="9967913"/>
+            <a:ext cx="6478588" cy="0"/>
+          </a:xfrm>
+          <a:prstGeom prst="line">
+            <a:avLst/>
+          </a:prstGeom>
+          <a:noFill/>
+          <a:ln w="7620">
+            <a:solidFill>
+              <a:srgbClr val="000000"/>
+            </a:solidFill>
+            <a:round/>
+            <a:headEnd/>
+            <a:tailEnd/>
+          </a:ln>
+        </p:spPr>
+        <p:txBody>
+          <a:bodyPr/>
+          <a:lstStyle/>
+          <a:p>
+            <a:endParaRPr lang="de-DE" dirty="0"/>
+          </a:p>
+        </p:txBody>
+      </p:sp>
+      <p:sp>
+        <p:nvSpPr>
+          <p:cNvPr id="14" name="Line 23"/>
+          <p:cNvSpPr>
+            <a:spLocks noChangeShapeType="1"/>
+          </p:cNvSpPr>
+          <p:nvPr/>
+        </p:nvSpPr>
+        <p:spPr bwMode="auto">
+          <a:xfrm flipV="1">
+            <a:off x="101600" y="6311899"/>
+            <a:ext cx="8940800" cy="1"/>
+          </a:xfrm>
+          <a:prstGeom prst="line">
+            <a:avLst/>
+          </a:prstGeom>
+          <a:noFill/>
+          <a:ln w="15240">
+            <a:solidFill>
+              <a:srgbClr val="000000"/>
+            </a:solidFill>
+            <a:round/>
+            <a:headEnd/>
+            <a:tailEnd/>
+          </a:ln>
+        </p:spPr>
+        <p:txBody>
+          <a:bodyPr/>
+          <a:lstStyle/>
+          <a:p>
+            <a:endParaRPr lang="de-DE" dirty="0"/>
+          </a:p>
+        </p:txBody>
+      </p:sp>
+      <p:pic>
+        <p:nvPicPr>
+          <p:cNvPr id="15" name="Picture 24" descr="tud_logo"/>
+          <p:cNvPicPr>
+            <a:picLocks noChangeAspect="1" noChangeArrowheads="1"/>
+          </p:cNvPicPr>
+          <p:nvPr/>
+        </p:nvPicPr>
+        <p:blipFill>
+          <a:blip r:embed="rId3" cstate="print"/>
+          <a:srcRect/>
+          <a:stretch>
+            <a:fillRect/>
+          </a:stretch>
+        </p:blipFill>
+        <p:spPr bwMode="auto">
+          <a:xfrm>
+            <a:off x="7162796" y="431972"/>
+            <a:ext cx="1981204" cy="792482"/>
+          </a:xfrm>
+          <a:prstGeom prst="rect">
+            <a:avLst/>
+          </a:prstGeom>
+          <a:noFill/>
+        </p:spPr>
+      </p:pic>
+      <p:sp>
+        <p:nvSpPr>
+          <p:cNvPr id="19" name="Line 23"/>
+          <p:cNvSpPr>
+            <a:spLocks noChangeShapeType="1"/>
+          </p:cNvSpPr>
+          <p:nvPr/>
+        </p:nvSpPr>
+        <p:spPr bwMode="auto">
+          <a:xfrm flipV="1">
+            <a:off x="101600" y="1313355"/>
+            <a:ext cx="8940800" cy="1"/>
+          </a:xfrm>
+          <a:prstGeom prst="line">
+            <a:avLst/>
+          </a:prstGeom>
+          <a:noFill/>
+          <a:ln w="9525">
+            <a:solidFill>
+              <a:schemeClr val="tx1">
+                <a:lumMod val="85000"/>
+                <a:lumOff val="15000"/>
+              </a:schemeClr>
+            </a:solidFill>
+            <a:round/>
+            <a:headEnd/>
+            <a:tailEnd/>
+          </a:ln>
+        </p:spPr>
+        <p:txBody>
+          <a:bodyPr/>
+          <a:lstStyle/>
+          <a:p>
+            <a:endParaRPr lang="de-DE" dirty="0"/>
+          </a:p>
+        </p:txBody>
+      </p:sp>
+      <p:sp>
+        <p:nvSpPr>
+          <p:cNvPr id="20" name="Textfeld 19"/>
+          <p:cNvSpPr txBox="1"/>
+          <p:nvPr/>
+        </p:nvSpPr>
+        <p:spPr>
+          <a:xfrm>
+            <a:off x="101600" y="621321"/>
+            <a:ext cx="7061196" cy="461665"/>
+          </a:xfrm>
+          <a:prstGeom prst="rect">
+            <a:avLst/>
+          </a:prstGeom>
+          <a:noFill/>
+        </p:spPr>
+        <p:txBody>
+          <a:bodyPr wrap="square" rtlCol="0">
+            <a:spAutoFit/>
+          </a:bodyPr>
+          <a:lstStyle/>
+          <a:p>
+            <a:r>
+              <a:rPr lang="de-DE" sz="2400" b="1" dirty="0" smtClean="0"/>
+              <a:t>Aufgabe 4</a:t>
+            </a:r>
+            <a:endParaRPr lang="de-DE" dirty="0"/>
+          </a:p>
+        </p:txBody>
+      </p:sp>
+      <p:sp>
+        <p:nvSpPr>
+          <p:cNvPr id="3" name="Textfeld 2"/>
+          <p:cNvSpPr txBox="1"/>
+          <p:nvPr/>
+        </p:nvSpPr>
+        <p:spPr>
+          <a:xfrm>
+            <a:off x="465512" y="1459724"/>
+            <a:ext cx="8212975" cy="4524315"/>
+          </a:xfrm>
+          <a:prstGeom prst="rect">
+            <a:avLst/>
+          </a:prstGeom>
+          <a:noFill/>
+        </p:spPr>
+        <p:txBody>
+          <a:bodyPr wrap="square" rtlCol="0">
+            <a:spAutoFit/>
+          </a:bodyPr>
+          <a:lstStyle/>
+          <a:p>
+            <a:r>
+              <a:rPr lang="de-DE" b="1" dirty="0" smtClean="0"/>
+              <a:t>Gewählte Suchmaschinen:	</a:t>
+            </a:r>
+            <a:r>
+              <a:rPr lang="de-DE" dirty="0" smtClean="0"/>
+              <a:t>Google, Bing</a:t>
+            </a:r>
+          </a:p>
+          <a:p>
+            <a:endParaRPr lang="de-DE" dirty="0"/>
+          </a:p>
+          <a:p>
+            <a:r>
+              <a:rPr lang="de-DE" b="1" dirty="0" smtClean="0"/>
+              <a:t>Abschätzung der Größe des Sprachspezifischen Index:</a:t>
+            </a:r>
+          </a:p>
+          <a:p>
+            <a:endParaRPr lang="de-DE" dirty="0" smtClean="0"/>
+          </a:p>
+          <a:p>
+            <a:r>
+              <a:rPr lang="de-DE" dirty="0" smtClean="0"/>
+              <a:t>Einfache Suchanfragen wie „*  *“, die alle Ergebnisse ausgeben, gibt es nicht oder haben wir nicht gefunden.</a:t>
+            </a:r>
+          </a:p>
+          <a:p>
+            <a:endParaRPr lang="de-DE" dirty="0"/>
+          </a:p>
+          <a:p>
+            <a:endParaRPr lang="de-DE" b="1" dirty="0" smtClean="0"/>
+          </a:p>
+          <a:p>
+            <a:r>
+              <a:rPr lang="de-DE" b="1" dirty="0" smtClean="0"/>
+              <a:t>Idee:</a:t>
+            </a:r>
+          </a:p>
+          <a:p>
+            <a:endParaRPr lang="de-DE" b="1" dirty="0"/>
+          </a:p>
+          <a:p>
+            <a:r>
+              <a:rPr lang="de-DE" dirty="0" smtClean="0"/>
+              <a:t>Suchanfrage, die zumindest eins der 30 häufigsten Wörter der deutschen Sprache enthält. (Quelle: </a:t>
+            </a:r>
+            <a:r>
+              <a:rPr lang="de-DE" dirty="0" smtClean="0">
+                <a:hlinkClick r:id="rId4"/>
+              </a:rPr>
+              <a:t>Liste der häufigsten Wörter der deutschen Sprache</a:t>
+            </a:r>
+            <a:r>
+              <a:rPr lang="de-DE" dirty="0" smtClean="0"/>
+              <a:t>)</a:t>
+            </a:r>
+          </a:p>
+          <a:p>
+            <a:endParaRPr lang="de-DE" dirty="0"/>
+          </a:p>
+          <a:p>
+            <a:r>
+              <a:rPr lang="de-DE" dirty="0" smtClean="0"/>
+              <a:t>Google: 	die OR der OR und OR in OR zu OR den OR das OR nicht…</a:t>
+            </a:r>
+          </a:p>
+          <a:p>
+            <a:r>
+              <a:rPr lang="de-DE" dirty="0" smtClean="0"/>
+              <a:t>Bing:	die |der |und |in |zu |den |das |nicht…</a:t>
+            </a:r>
+          </a:p>
+          <a:p>
+            <a:endParaRPr lang="de-DE" dirty="0"/>
+          </a:p>
+        </p:txBody>
+      </p:sp>
+      <p:sp>
+        <p:nvSpPr>
+          <p:cNvPr id="2" name="Foliennummernplatzhalter 1"/>
+          <p:cNvSpPr>
+            <a:spLocks noGrp="1"/>
+          </p:cNvSpPr>
+          <p:nvPr>
+            <p:ph type="sldNum" sz="quarter" idx="12"/>
+          </p:nvPr>
+        </p:nvSpPr>
+        <p:spPr/>
+        <p:txBody>
+          <a:bodyPr/>
+          <a:lstStyle/>
+          <a:p>
+            <a:fld id="{2330A4B3-4A2D-41F8-ABB6-3A93FC7C65B9}" type="slidenum">
+              <a:rPr lang="de-DE" smtClean="0"/>
+              <a:t>4</a:t>
+            </a:fld>
+            <a:endParaRPr lang="de-DE" dirty="0"/>
+          </a:p>
+        </p:txBody>
+      </p:sp>
+    </p:spTree>
+    <p:extLst>
+      <p:ext uri="{BB962C8B-B14F-4D97-AF65-F5344CB8AC3E}">
+        <p14:creationId xmlns:p14="http://schemas.microsoft.com/office/powerpoint/2010/main" val="2474643230"/>
+      </p:ext>
+    </p:extLst>
+  </p:cSld>
+  <p:clrMapOvr>
+    <a:masterClrMapping/>
+  </p:clrMapOvr>
+  <p:timing>
+    <p:tnLst>
+      <p:par>
+        <p:cTn id="1" dur="indefinite" restart="never" nodeType="tmRoot"/>
+      </p:par>
+    </p:tnLst>
+  </p:timing>
+</p:sld>
+</file>
+
+<file path=ppt/slides/slide6.xml><?xml version="1.0" encoding="utf-8"?>
+<p:sld xmlns:a="http://schemas.openxmlformats.org/drawingml/2006/main" xmlns:r="http://schemas.openxmlformats.org/officeDocument/2006/relationships" xmlns:p="http://schemas.openxmlformats.org/presentationml/2006/main">
+  <p:cSld>
+    <p:spTree>
+      <p:nvGrpSpPr>
+        <p:cNvPr id="1" name=""/>
+        <p:cNvGrpSpPr/>
+        <p:nvPr/>
+      </p:nvGrpSpPr>
+      <p:grpSpPr>
+        <a:xfrm>
+          <a:off x="0" y="0"/>
+          <a:ext cx="0" cy="0"/>
+          <a:chOff x="0" y="0"/>
+          <a:chExt cx="0" cy="0"/>
+        </a:xfrm>
+      </p:grpSpPr>
+      <p:sp>
+        <p:nvSpPr>
+          <p:cNvPr id="4" name="Rectangle 4"/>
+          <p:cNvSpPr>
+            <a:spLocks noChangeArrowheads="1"/>
+          </p:cNvSpPr>
+          <p:nvPr/>
+        </p:nvSpPr>
+        <p:spPr bwMode="auto">
+          <a:xfrm>
+            <a:off x="101600" y="82468"/>
+            <a:ext cx="8940800" cy="260603"/>
+          </a:xfrm>
+          <a:prstGeom prst="rect">
+            <a:avLst/>
+          </a:prstGeom>
+          <a:solidFill>
+            <a:srgbClr val="B90F22"/>
+          </a:solidFill>
+          <a:ln w="3175">
+            <a:noFill/>
+            <a:miter lim="800000"/>
+            <a:headEnd/>
+            <a:tailEnd/>
+          </a:ln>
+        </p:spPr>
+        <p:txBody>
+          <a:bodyPr/>
+          <a:lstStyle/>
+          <a:p>
+            <a:endParaRPr lang="de-DE" dirty="0"/>
+          </a:p>
+        </p:txBody>
+      </p:sp>
+      <p:sp>
+        <p:nvSpPr>
+          <p:cNvPr id="6" name="Line 23"/>
+          <p:cNvSpPr>
+            <a:spLocks noChangeShapeType="1"/>
+          </p:cNvSpPr>
+          <p:nvPr/>
+        </p:nvSpPr>
+        <p:spPr bwMode="auto">
+          <a:xfrm flipV="1">
+            <a:off x="101600" y="387521"/>
+            <a:ext cx="8940800" cy="0"/>
+          </a:xfrm>
+          <a:prstGeom prst="line">
+            <a:avLst/>
+          </a:prstGeom>
+          <a:noFill/>
+          <a:ln w="15240">
+            <a:solidFill>
+              <a:srgbClr val="000000"/>
+            </a:solidFill>
+            <a:round/>
+            <a:headEnd/>
+            <a:tailEnd/>
+          </a:ln>
+        </p:spPr>
+        <p:txBody>
+          <a:bodyPr/>
+          <a:lstStyle/>
+          <a:p>
+            <a:endParaRPr lang="de-DE" dirty="0"/>
+          </a:p>
+        </p:txBody>
+      </p:sp>
+      <p:sp>
+        <p:nvSpPr>
+          <p:cNvPr id="8" name="Line 28"/>
+          <p:cNvSpPr>
+            <a:spLocks noChangeShapeType="1"/>
+          </p:cNvSpPr>
+          <p:nvPr/>
+        </p:nvSpPr>
+        <p:spPr bwMode="auto">
+          <a:xfrm>
+            <a:off x="-984250" y="9967913"/>
+            <a:ext cx="6478588" cy="0"/>
+          </a:xfrm>
+          <a:prstGeom prst="line">
+            <a:avLst/>
+          </a:prstGeom>
+          <a:noFill/>
+          <a:ln w="7620">
+            <a:solidFill>
+              <a:srgbClr val="000000"/>
+            </a:solidFill>
+            <a:round/>
+            <a:headEnd/>
+            <a:tailEnd/>
+          </a:ln>
+        </p:spPr>
+        <p:txBody>
+          <a:bodyPr/>
+          <a:lstStyle/>
+          <a:p>
+            <a:endParaRPr lang="de-DE" dirty="0"/>
+          </a:p>
+        </p:txBody>
+      </p:sp>
+      <p:sp>
+        <p:nvSpPr>
+          <p:cNvPr id="14" name="Line 23"/>
+          <p:cNvSpPr>
+            <a:spLocks noChangeShapeType="1"/>
+          </p:cNvSpPr>
+          <p:nvPr/>
+        </p:nvSpPr>
+        <p:spPr bwMode="auto">
+          <a:xfrm flipV="1">
+            <a:off x="101600" y="6311899"/>
+            <a:ext cx="8940800" cy="1"/>
+          </a:xfrm>
+          <a:prstGeom prst="line">
+            <a:avLst/>
+          </a:prstGeom>
+          <a:noFill/>
+          <a:ln w="15240">
+            <a:solidFill>
+              <a:srgbClr val="000000"/>
+            </a:solidFill>
+            <a:round/>
+            <a:headEnd/>
+            <a:tailEnd/>
+          </a:ln>
+        </p:spPr>
+        <p:txBody>
+          <a:bodyPr/>
+          <a:lstStyle/>
+          <a:p>
+            <a:endParaRPr lang="de-DE" dirty="0"/>
+          </a:p>
+        </p:txBody>
+      </p:sp>
+      <p:pic>
+        <p:nvPicPr>
+          <p:cNvPr id="15" name="Picture 24" descr="tud_logo"/>
+          <p:cNvPicPr>
+            <a:picLocks noChangeAspect="1" noChangeArrowheads="1"/>
+          </p:cNvPicPr>
+          <p:nvPr/>
+        </p:nvPicPr>
+        <p:blipFill>
+          <a:blip r:embed="rId3" cstate="print"/>
+          <a:srcRect/>
+          <a:stretch>
+            <a:fillRect/>
+          </a:stretch>
+        </p:blipFill>
+        <p:spPr bwMode="auto">
+          <a:xfrm>
+            <a:off x="7162796" y="431972"/>
+            <a:ext cx="1981204" cy="792482"/>
+          </a:xfrm>
+          <a:prstGeom prst="rect">
+            <a:avLst/>
+          </a:prstGeom>
+          <a:noFill/>
+        </p:spPr>
+      </p:pic>
+      <p:sp>
+        <p:nvSpPr>
+          <p:cNvPr id="19" name="Line 23"/>
+          <p:cNvSpPr>
+            <a:spLocks noChangeShapeType="1"/>
+          </p:cNvSpPr>
+          <p:nvPr/>
+        </p:nvSpPr>
+        <p:spPr bwMode="auto">
+          <a:xfrm flipV="1">
+            <a:off x="101600" y="1313355"/>
+            <a:ext cx="8940800" cy="1"/>
+          </a:xfrm>
+          <a:prstGeom prst="line">
+            <a:avLst/>
+          </a:prstGeom>
+          <a:noFill/>
+          <a:ln w="9525">
+            <a:solidFill>
+              <a:schemeClr val="tx1">
+                <a:lumMod val="85000"/>
+                <a:lumOff val="15000"/>
+              </a:schemeClr>
+            </a:solidFill>
+            <a:round/>
+            <a:headEnd/>
+            <a:tailEnd/>
+          </a:ln>
+        </p:spPr>
+        <p:txBody>
+          <a:bodyPr/>
+          <a:lstStyle/>
+          <a:p>
+            <a:endParaRPr lang="de-DE" dirty="0"/>
+          </a:p>
+        </p:txBody>
+      </p:sp>
+      <p:sp>
+        <p:nvSpPr>
+          <p:cNvPr id="20" name="Textfeld 19"/>
+          <p:cNvSpPr txBox="1"/>
+          <p:nvPr/>
+        </p:nvSpPr>
+        <p:spPr>
+          <a:xfrm>
+            <a:off x="101600" y="621321"/>
+            <a:ext cx="7061196" cy="461665"/>
+          </a:xfrm>
+          <a:prstGeom prst="rect">
+            <a:avLst/>
+          </a:prstGeom>
+          <a:noFill/>
+        </p:spPr>
+        <p:txBody>
+          <a:bodyPr wrap="square" rtlCol="0">
+            <a:spAutoFit/>
+          </a:bodyPr>
+          <a:lstStyle/>
+          <a:p>
+            <a:r>
+              <a:rPr lang="de-DE" sz="2400" b="1" dirty="0" smtClean="0"/>
+              <a:t>Aufgabe 4</a:t>
+            </a:r>
+            <a:endParaRPr lang="de-DE" dirty="0"/>
+          </a:p>
+        </p:txBody>
+      </p:sp>
+      <mc:AlternateContent xmlns:mc="http://schemas.openxmlformats.org/markup-compatibility/2006">
+        <mc:Choice xmlns:a14="http://schemas.microsoft.com/office/drawing/2010/main" Requires="a14">
+          <p:sp>
+            <p:nvSpPr>
+              <p:cNvPr id="3" name="Textfeld 2"/>
+              <p:cNvSpPr txBox="1"/>
+              <p:nvPr/>
+            </p:nvSpPr>
+            <p:spPr>
+              <a:xfrm>
+                <a:off x="465512" y="1459724"/>
+                <a:ext cx="8212975" cy="3783600"/>
+              </a:xfrm>
+              <a:prstGeom prst="rect">
+                <a:avLst/>
+              </a:prstGeom>
+              <a:noFill/>
+            </p:spPr>
+            <p:txBody>
+              <a:bodyPr wrap="square" rtlCol="0">
+                <a:spAutoFit/>
+              </a:bodyPr>
+              <a:lstStyle/>
+              <a:p>
+                <a:r>
+                  <a:rPr lang="de-DE" b="1" dirty="0" smtClean="0"/>
+                  <a:t>Ergebnisse:</a:t>
+                </a:r>
+              </a:p>
+              <a:p>
+                <a:endParaRPr lang="de-DE" b="1" dirty="0"/>
+              </a:p>
+              <a:p>
+                <a14:m>
+                  <m:oMath xmlns:m="http://schemas.openxmlformats.org/officeDocument/2006/math">
+                    <m:sSub>
+                      <m:sSubPr>
+                        <m:ctrlPr>
+                          <a:rPr lang="de-DE" b="0" i="1" smtClean="0">
+                            <a:latin typeface="Cambria Math"/>
+                          </a:rPr>
+                        </m:ctrlPr>
+                      </m:sSubPr>
+                      <m:e>
+                        <m:r>
+                          <a:rPr lang="de-DE" b="0" i="1" smtClean="0">
+                            <a:latin typeface="Cambria Math"/>
+                          </a:rPr>
+                          <m:t>𝑆</m:t>
+                        </m:r>
+                      </m:e>
+                      <m:sub>
+                        <m:r>
+                          <a:rPr lang="de-DE" b="0" i="1" smtClean="0">
+                            <a:latin typeface="Cambria Math"/>
+                          </a:rPr>
+                          <m:t>𝑔𝑜𝑜𝑔𝑙𝑒</m:t>
+                        </m:r>
+                      </m:sub>
+                    </m:sSub>
+                    <m:r>
+                      <a:rPr lang="de-DE" b="0" i="0" smtClean="0">
+                        <a:latin typeface="Cambria Math"/>
+                      </a:rPr>
+                      <m:t> </m:t>
+                    </m:r>
+                  </m:oMath>
+                </a14:m>
+                <a:r>
+                  <a:rPr lang="de-DE" dirty="0" smtClean="0"/>
+                  <a:t>= 4.250.000.000 Ergebnisse</a:t>
+                </a:r>
+              </a:p>
+              <a:p>
+                <a14:m>
+                  <m:oMath xmlns:m="http://schemas.openxmlformats.org/officeDocument/2006/math">
+                    <m:sSub>
+                      <m:sSubPr>
+                        <m:ctrlPr>
+                          <a:rPr lang="de-DE" b="0" i="1" smtClean="0">
+                            <a:latin typeface="Cambria Math"/>
+                          </a:rPr>
+                        </m:ctrlPr>
+                      </m:sSubPr>
+                      <m:e>
+                        <m:r>
+                          <a:rPr lang="de-DE" b="0" i="1" smtClean="0">
+                            <a:latin typeface="Cambria Math"/>
+                          </a:rPr>
+                          <m:t>𝑆</m:t>
+                        </m:r>
+                      </m:e>
+                      <m:sub>
+                        <m:r>
+                          <a:rPr lang="de-DE" b="0" i="1" smtClean="0">
+                            <a:latin typeface="Cambria Math"/>
+                          </a:rPr>
+                          <m:t>𝑏𝑖𝑛𝑔</m:t>
+                        </m:r>
+                      </m:sub>
+                    </m:sSub>
+                  </m:oMath>
+                </a14:m>
+                <a:r>
+                  <a:rPr lang="de-DE" dirty="0" smtClean="0"/>
+                  <a:t> = 3.370.000.000 Ergebnisse</a:t>
+                </a:r>
+              </a:p>
+              <a:p>
+                <a:endParaRPr lang="de-DE" dirty="0"/>
+              </a:p>
+              <a:p>
+                <a:r>
+                  <a:rPr lang="de-DE" b="1" dirty="0" smtClean="0"/>
+                  <a:t>Suchanfrage zur Abschätzung des </a:t>
+                </a:r>
+                <a:r>
+                  <a:rPr lang="de-DE" b="1" dirty="0" err="1" smtClean="0"/>
+                  <a:t>Overlaps</a:t>
+                </a:r>
+                <a:r>
+                  <a:rPr lang="de-DE" b="1" dirty="0" smtClean="0"/>
+                  <a:t>:</a:t>
+                </a:r>
+                <a:endParaRPr lang="de-DE" b="1" dirty="0"/>
+              </a:p>
+              <a:p>
+                <a:r>
+                  <a:rPr lang="de-DE" dirty="0" smtClean="0"/>
+                  <a:t>Query: </a:t>
+                </a:r>
+                <a:r>
+                  <a:rPr lang="de-DE" dirty="0" smtClean="0"/>
+                  <a:t>„Darmstadt ist schön “</a:t>
+                </a:r>
+                <a:endParaRPr lang="de-DE" dirty="0" smtClean="0"/>
+              </a:p>
+              <a:p>
+                <a:endParaRPr lang="de-DE" dirty="0"/>
+              </a:p>
+              <a:p>
+                <a14:m>
+                  <m:oMath xmlns:m="http://schemas.openxmlformats.org/officeDocument/2006/math">
+                    <m:sSub>
+                      <m:sSubPr>
+                        <m:ctrlPr>
+                          <a:rPr lang="de-DE" b="0" i="1" smtClean="0">
+                            <a:latin typeface="Cambria Math"/>
+                          </a:rPr>
+                        </m:ctrlPr>
+                      </m:sSubPr>
+                      <m:e>
+                        <m:r>
+                          <a:rPr lang="de-DE" b="0" i="1" smtClean="0">
+                            <a:latin typeface="Cambria Math"/>
+                          </a:rPr>
+                          <m:t>𝑛</m:t>
+                        </m:r>
+                      </m:e>
+                      <m:sub>
+                        <m:r>
+                          <a:rPr lang="de-DE" b="0" i="1" smtClean="0">
+                            <a:latin typeface="Cambria Math"/>
+                          </a:rPr>
+                          <m:t>𝑔𝑜𝑜𝑔𝑙𝑒</m:t>
+                        </m:r>
+                      </m:sub>
+                    </m:sSub>
+                  </m:oMath>
+                </a14:m>
+                <a:r>
+                  <a:rPr lang="de-DE" dirty="0" smtClean="0"/>
+                  <a:t>= </a:t>
+                </a:r>
+                <a:r>
+                  <a:rPr lang="de-DE" dirty="0" smtClean="0"/>
+                  <a:t>920</a:t>
+                </a:r>
+                <a:endParaRPr lang="de-DE" dirty="0" smtClean="0"/>
+              </a:p>
+              <a:p>
+                <a14:m>
+                  <m:oMath xmlns:m="http://schemas.openxmlformats.org/officeDocument/2006/math">
+                    <m:sSub>
+                      <m:sSubPr>
+                        <m:ctrlPr>
+                          <a:rPr lang="de-DE" b="0" i="1" smtClean="0">
+                            <a:latin typeface="Cambria Math"/>
+                          </a:rPr>
+                        </m:ctrlPr>
+                      </m:sSubPr>
+                      <m:e>
+                        <m:r>
+                          <a:rPr lang="de-DE" b="0" i="1" smtClean="0">
+                            <a:latin typeface="Cambria Math"/>
+                          </a:rPr>
+                          <m:t>𝑛</m:t>
+                        </m:r>
+                      </m:e>
+                      <m:sub>
+                        <m:r>
+                          <a:rPr lang="de-DE" b="0" i="1" smtClean="0">
+                            <a:latin typeface="Cambria Math"/>
+                          </a:rPr>
+                          <m:t>𝑏𝑖𝑛𝑔</m:t>
+                        </m:r>
+                      </m:sub>
+                    </m:sSub>
+                  </m:oMath>
+                </a14:m>
+                <a:r>
+                  <a:rPr lang="de-DE" dirty="0" smtClean="0"/>
+                  <a:t>= </a:t>
+                </a:r>
+                <a:r>
+                  <a:rPr lang="de-DE" dirty="0" smtClean="0"/>
+                  <a:t>98 </a:t>
+                </a:r>
+                <a:endParaRPr lang="de-DE" dirty="0" smtClean="0"/>
+              </a:p>
+              <a:p>
+                <a:endParaRPr lang="de-DE" dirty="0"/>
+              </a:p>
+              <a:p>
+                <a:r>
+                  <a:rPr lang="de-DE" dirty="0" smtClean="0"/>
+                  <a:t>Gemeinsame Treffer:</a:t>
+                </a:r>
+              </a:p>
+              <a:p>
+                <a14:m>
+                  <m:oMath xmlns:m="http://schemas.openxmlformats.org/officeDocument/2006/math">
+                    <m:sSub>
+                      <m:sSubPr>
+                        <m:ctrlPr>
+                          <a:rPr lang="de-DE" b="0" i="1" smtClean="0">
+                            <a:latin typeface="Cambria Math"/>
+                          </a:rPr>
+                        </m:ctrlPr>
+                      </m:sSubPr>
+                      <m:e>
+                        <m:r>
+                          <a:rPr lang="de-DE" b="0" i="1" smtClean="0">
+                            <a:latin typeface="Cambria Math"/>
+                          </a:rPr>
+                          <m:t>𝑛</m:t>
+                        </m:r>
+                      </m:e>
+                      <m:sub>
+                        <m:r>
+                          <a:rPr lang="de-DE" b="0" i="1" smtClean="0">
+                            <a:latin typeface="Cambria Math"/>
+                          </a:rPr>
+                          <m:t>0</m:t>
+                        </m:r>
+                      </m:sub>
+                    </m:sSub>
+                  </m:oMath>
+                </a14:m>
+                <a:r>
+                  <a:rPr lang="de-DE" dirty="0" smtClean="0"/>
+                  <a:t>= </a:t>
+                </a:r>
+                <a:r>
+                  <a:rPr lang="de-DE" dirty="0" smtClean="0"/>
+                  <a:t>1</a:t>
+                </a:r>
+                <a:endParaRPr lang="de-DE" dirty="0"/>
+              </a:p>
+            </p:txBody>
+          </p:sp>
+        </mc:Choice>
+        <mc:Fallback>
+          <p:sp>
+            <p:nvSpPr>
+              <p:cNvPr id="3" name="Textfeld 2"/>
+              <p:cNvSpPr txBox="1">
+                <a:spLocks noRot="1" noChangeAspect="1" noMove="1" noResize="1" noEditPoints="1" noAdjustHandles="1" noChangeArrowheads="1" noChangeShapeType="1" noTextEdit="1"/>
+              </p:cNvSpPr>
+              <p:nvPr/>
+            </p:nvSpPr>
+            <p:spPr>
+              <a:xfrm>
+                <a:off x="465512" y="1459724"/>
+                <a:ext cx="8212975" cy="3783600"/>
+              </a:xfrm>
+              <a:prstGeom prst="rect">
+                <a:avLst/>
+              </a:prstGeom>
+              <a:blipFill rotWithShape="1">
+                <a:blip r:embed="rId4"/>
+                <a:stretch>
+                  <a:fillRect l="-593" t="-805" b="-1610"/>
+                </a:stretch>
+              </a:blipFill>
+            </p:spPr>
+            <p:txBody>
+              <a:bodyPr/>
+              <a:lstStyle/>
+              <a:p>
+                <a:r>
+                  <a:rPr lang="de-DE">
+                    <a:noFill/>
+                  </a:rPr>
+                  <a:t> </a:t>
+                </a:r>
+              </a:p>
+            </p:txBody>
+          </p:sp>
+        </mc:Fallback>
+      </mc:AlternateContent>
+      <p:sp>
+        <p:nvSpPr>
+          <p:cNvPr id="2" name="Foliennummernplatzhalter 1"/>
+          <p:cNvSpPr>
+            <a:spLocks noGrp="1"/>
+          </p:cNvSpPr>
+          <p:nvPr>
+            <p:ph type="sldNum" sz="quarter" idx="12"/>
+          </p:nvPr>
+        </p:nvSpPr>
+        <p:spPr/>
+        <p:txBody>
+          <a:bodyPr/>
+          <a:lstStyle/>
+          <a:p>
+            <a:fld id="{2330A4B3-4A2D-41F8-ABB6-3A93FC7C65B9}" type="slidenum">
+              <a:rPr lang="de-DE" smtClean="0"/>
+              <a:t>5</a:t>
+            </a:fld>
+            <a:endParaRPr lang="de-DE" dirty="0"/>
+          </a:p>
+        </p:txBody>
+      </p:sp>
+    </p:spTree>
+    <p:extLst>
+      <p:ext uri="{BB962C8B-B14F-4D97-AF65-F5344CB8AC3E}">
+        <p14:creationId xmlns:p14="http://schemas.microsoft.com/office/powerpoint/2010/main" val="3145708973"/>
+      </p:ext>
+    </p:extLst>
+  </p:cSld>
+  <p:clrMapOvr>
+    <a:masterClrMapping/>
+  </p:clrMapOvr>
+  <p:timing>
+    <p:tnLst>
+      <p:par>
+        <p:cTn id="1" dur="indefinite" restart="never" nodeType="tmRoot"/>
+      </p:par>
+    </p:tnLst>
+  </p:timing>
+</p:sld>
+</file>
+
+<file path=ppt/slides/slide7.xml><?xml version="1.0" encoding="utf-8"?>
+<p:sld xmlns:a="http://schemas.openxmlformats.org/drawingml/2006/main" xmlns:r="http://schemas.openxmlformats.org/officeDocument/2006/relationships" xmlns:p="http://schemas.openxmlformats.org/presentationml/2006/main">
+  <p:cSld>
+    <p:spTree>
+      <p:nvGrpSpPr>
+        <p:cNvPr id="1" name=""/>
+        <p:cNvGrpSpPr/>
+        <p:nvPr/>
+      </p:nvGrpSpPr>
+      <p:grpSpPr>
+        <a:xfrm>
+          <a:off x="0" y="0"/>
+          <a:ext cx="0" cy="0"/>
+          <a:chOff x="0" y="0"/>
+          <a:chExt cx="0" cy="0"/>
+        </a:xfrm>
+      </p:grpSpPr>
+      <p:sp>
+        <p:nvSpPr>
+          <p:cNvPr id="4" name="Rectangle 4"/>
+          <p:cNvSpPr>
+            <a:spLocks noChangeArrowheads="1"/>
+          </p:cNvSpPr>
+          <p:nvPr/>
+        </p:nvSpPr>
+        <p:spPr bwMode="auto">
+          <a:xfrm>
+            <a:off x="101600" y="82468"/>
+            <a:ext cx="8940800" cy="260603"/>
+          </a:xfrm>
+          <a:prstGeom prst="rect">
+            <a:avLst/>
+          </a:prstGeom>
+          <a:solidFill>
+            <a:srgbClr val="B90F22"/>
+          </a:solidFill>
+          <a:ln w="3175">
+            <a:noFill/>
+            <a:miter lim="800000"/>
+            <a:headEnd/>
+            <a:tailEnd/>
+          </a:ln>
+        </p:spPr>
+        <p:txBody>
+          <a:bodyPr/>
+          <a:lstStyle/>
+          <a:p>
+            <a:endParaRPr lang="de-DE" dirty="0"/>
+          </a:p>
+        </p:txBody>
+      </p:sp>
+      <p:sp>
+        <p:nvSpPr>
+          <p:cNvPr id="6" name="Line 23"/>
+          <p:cNvSpPr>
+            <a:spLocks noChangeShapeType="1"/>
+          </p:cNvSpPr>
+          <p:nvPr/>
+        </p:nvSpPr>
+        <p:spPr bwMode="auto">
+          <a:xfrm flipV="1">
+            <a:off x="101600" y="387521"/>
+            <a:ext cx="8940800" cy="0"/>
+          </a:xfrm>
+          <a:prstGeom prst="line">
+            <a:avLst/>
+          </a:prstGeom>
+          <a:noFill/>
+          <a:ln w="15240">
+            <a:solidFill>
+              <a:srgbClr val="000000"/>
+            </a:solidFill>
+            <a:round/>
+            <a:headEnd/>
+            <a:tailEnd/>
+          </a:ln>
+        </p:spPr>
+        <p:txBody>
+          <a:bodyPr/>
+          <a:lstStyle/>
+          <a:p>
+            <a:endParaRPr lang="de-DE" dirty="0"/>
+          </a:p>
+        </p:txBody>
+      </p:sp>
+      <p:sp>
+        <p:nvSpPr>
+          <p:cNvPr id="8" name="Line 28"/>
+          <p:cNvSpPr>
+            <a:spLocks noChangeShapeType="1"/>
+          </p:cNvSpPr>
+          <p:nvPr/>
+        </p:nvSpPr>
+        <p:spPr bwMode="auto">
+          <a:xfrm>
+            <a:off x="-984250" y="9967913"/>
+            <a:ext cx="6478588" cy="0"/>
+          </a:xfrm>
+          <a:prstGeom prst="line">
+            <a:avLst/>
+          </a:prstGeom>
+          <a:noFill/>
+          <a:ln w="7620">
+            <a:solidFill>
+              <a:srgbClr val="000000"/>
+            </a:solidFill>
+            <a:round/>
+            <a:headEnd/>
+            <a:tailEnd/>
+          </a:ln>
+        </p:spPr>
+        <p:txBody>
+          <a:bodyPr/>
+          <a:lstStyle/>
+          <a:p>
+            <a:endParaRPr lang="de-DE" dirty="0"/>
+          </a:p>
+        </p:txBody>
+      </p:sp>
+      <p:sp>
+        <p:nvSpPr>
+          <p:cNvPr id="14" name="Line 23"/>
+          <p:cNvSpPr>
+            <a:spLocks noChangeShapeType="1"/>
+          </p:cNvSpPr>
+          <p:nvPr/>
+        </p:nvSpPr>
+        <p:spPr bwMode="auto">
+          <a:xfrm flipV="1">
+            <a:off x="101600" y="6311899"/>
+            <a:ext cx="8940800" cy="1"/>
+          </a:xfrm>
+          <a:prstGeom prst="line">
+            <a:avLst/>
+          </a:prstGeom>
+          <a:noFill/>
+          <a:ln w="15240">
+            <a:solidFill>
+              <a:srgbClr val="000000"/>
+            </a:solidFill>
+            <a:round/>
+            <a:headEnd/>
+            <a:tailEnd/>
+          </a:ln>
+        </p:spPr>
+        <p:txBody>
+          <a:bodyPr/>
+          <a:lstStyle/>
+          <a:p>
+            <a:endParaRPr lang="de-DE" dirty="0"/>
+          </a:p>
+        </p:txBody>
+      </p:sp>
+      <p:pic>
+        <p:nvPicPr>
+          <p:cNvPr id="15" name="Picture 24" descr="tud_logo"/>
+          <p:cNvPicPr>
+            <a:picLocks noChangeAspect="1" noChangeArrowheads="1"/>
+          </p:cNvPicPr>
+          <p:nvPr/>
+        </p:nvPicPr>
+        <p:blipFill>
+          <a:blip r:embed="rId3" cstate="print"/>
+          <a:srcRect/>
+          <a:stretch>
+            <a:fillRect/>
+          </a:stretch>
+        </p:blipFill>
+        <p:spPr bwMode="auto">
+          <a:xfrm>
+            <a:off x="7162796" y="431972"/>
+            <a:ext cx="1981204" cy="792482"/>
+          </a:xfrm>
+          <a:prstGeom prst="rect">
+            <a:avLst/>
+          </a:prstGeom>
+          <a:noFill/>
+        </p:spPr>
+      </p:pic>
+      <p:sp>
+        <p:nvSpPr>
+          <p:cNvPr id="19" name="Line 23"/>
+          <p:cNvSpPr>
+            <a:spLocks noChangeShapeType="1"/>
+          </p:cNvSpPr>
+          <p:nvPr/>
+        </p:nvSpPr>
+        <p:spPr bwMode="auto">
+          <a:xfrm flipV="1">
+            <a:off x="101600" y="1313355"/>
+            <a:ext cx="8940800" cy="1"/>
+          </a:xfrm>
+          <a:prstGeom prst="line">
+            <a:avLst/>
+          </a:prstGeom>
+          <a:noFill/>
+          <a:ln w="9525">
+            <a:solidFill>
+              <a:schemeClr val="tx1">
+                <a:lumMod val="85000"/>
+                <a:lumOff val="15000"/>
+              </a:schemeClr>
+            </a:solidFill>
+            <a:round/>
+            <a:headEnd/>
+            <a:tailEnd/>
+          </a:ln>
+        </p:spPr>
+        <p:txBody>
+          <a:bodyPr/>
+          <a:lstStyle/>
+          <a:p>
+            <a:endParaRPr lang="de-DE" dirty="0"/>
+          </a:p>
+        </p:txBody>
+      </p:sp>
+      <p:sp>
+        <p:nvSpPr>
+          <p:cNvPr id="20" name="Textfeld 19"/>
+          <p:cNvSpPr txBox="1"/>
+          <p:nvPr/>
+        </p:nvSpPr>
+        <p:spPr>
+          <a:xfrm>
+            <a:off x="101600" y="621321"/>
+            <a:ext cx="7061196" cy="461665"/>
+          </a:xfrm>
+          <a:prstGeom prst="rect">
+            <a:avLst/>
+          </a:prstGeom>
+          <a:noFill/>
+        </p:spPr>
+        <p:txBody>
+          <a:bodyPr wrap="square" rtlCol="0">
+            <a:spAutoFit/>
+          </a:bodyPr>
+          <a:lstStyle/>
+          <a:p>
+            <a:r>
+              <a:rPr lang="de-DE" sz="2400" b="1" dirty="0" smtClean="0"/>
+              <a:t>Aufgabe 4</a:t>
+            </a:r>
+            <a:endParaRPr lang="de-DE" dirty="0"/>
+          </a:p>
+        </p:txBody>
+      </p:sp>
+      <mc:AlternateContent xmlns:mc="http://schemas.openxmlformats.org/markup-compatibility/2006">
+        <mc:Choice xmlns:a14="http://schemas.microsoft.com/office/drawing/2010/main" Requires="a14">
+          <p:sp>
+            <p:nvSpPr>
+              <p:cNvPr id="3" name="Textfeld 2"/>
+              <p:cNvSpPr txBox="1"/>
+              <p:nvPr/>
+            </p:nvSpPr>
+            <p:spPr>
+              <a:xfrm>
+                <a:off x="465512" y="1459724"/>
+                <a:ext cx="8212975" cy="5342553"/>
+              </a:xfrm>
+              <a:prstGeom prst="rect">
+                <a:avLst/>
+              </a:prstGeom>
+              <a:noFill/>
+            </p:spPr>
+            <p:txBody>
+              <a:bodyPr wrap="square" rtlCol="0">
+                <a:spAutoFit/>
+              </a:bodyPr>
+              <a:lstStyle/>
+              <a:p>
+                <a14:m>
+                  <m:oMath xmlns:m="http://schemas.openxmlformats.org/officeDocument/2006/math">
+                    <m:sSub>
+                      <m:sSubPr>
+                        <m:ctrlPr>
+                          <a:rPr lang="de-DE" i="1" smtClean="0">
+                            <a:latin typeface="Cambria Math"/>
+                          </a:rPr>
+                        </m:ctrlPr>
+                      </m:sSubPr>
+                      <m:e>
+                        <m:r>
+                          <a:rPr lang="de-DE" i="1">
+                            <a:latin typeface="Cambria Math"/>
+                          </a:rPr>
+                          <m:t>𝑆</m:t>
+                        </m:r>
+                      </m:e>
+                      <m:sub>
+                        <m:r>
+                          <a:rPr lang="de-DE" i="1">
+                            <a:latin typeface="Cambria Math"/>
+                          </a:rPr>
+                          <m:t>𝑔𝑜𝑜𝑔𝑙𝑒</m:t>
+                        </m:r>
+                      </m:sub>
+                    </m:sSub>
+                    <m:r>
+                      <a:rPr lang="de-DE">
+                        <a:latin typeface="Cambria Math"/>
+                      </a:rPr>
+                      <m:t> </m:t>
+                    </m:r>
+                  </m:oMath>
+                </a14:m>
+                <a:r>
+                  <a:rPr lang="de-DE" dirty="0"/>
+                  <a:t>= </a:t>
+                </a:r>
+                <a:r>
+                  <a:rPr lang="de-DE" dirty="0" smtClean="0"/>
+                  <a:t>4.250.000.000		</a:t>
+                </a:r>
+                <a:r>
+                  <a:rPr lang="de-DE" dirty="0"/>
+                  <a:t> </a:t>
+                </a:r>
+                <a14:m>
+                  <m:oMath xmlns:m="http://schemas.openxmlformats.org/officeDocument/2006/math">
+                    <m:sSub>
+                      <m:sSubPr>
+                        <m:ctrlPr>
+                          <a:rPr lang="de-DE" i="1">
+                            <a:latin typeface="Cambria Math"/>
+                          </a:rPr>
+                        </m:ctrlPr>
+                      </m:sSubPr>
+                      <m:e>
+                        <m:r>
+                          <a:rPr lang="de-DE" i="1">
+                            <a:latin typeface="Cambria Math"/>
+                          </a:rPr>
+                          <m:t>𝑛</m:t>
+                        </m:r>
+                      </m:e>
+                      <m:sub>
+                        <m:r>
+                          <a:rPr lang="de-DE" i="1">
+                            <a:latin typeface="Cambria Math"/>
+                          </a:rPr>
+                          <m:t>𝑔𝑜𝑜𝑔𝑙𝑒</m:t>
+                        </m:r>
+                      </m:sub>
+                    </m:sSub>
+                  </m:oMath>
+                </a14:m>
+                <a:r>
+                  <a:rPr lang="de-DE" dirty="0"/>
+                  <a:t>= </a:t>
+                </a:r>
+                <a:r>
+                  <a:rPr lang="de-DE" dirty="0" smtClean="0"/>
+                  <a:t>920</a:t>
+                </a:r>
+                <a:endParaRPr lang="de-DE" dirty="0"/>
+              </a:p>
+              <a:p>
+                <a14:m>
+                  <m:oMath xmlns:m="http://schemas.openxmlformats.org/officeDocument/2006/math">
+                    <m:sSub>
+                      <m:sSubPr>
+                        <m:ctrlPr>
+                          <a:rPr lang="de-DE" i="1">
+                            <a:latin typeface="Cambria Math"/>
+                          </a:rPr>
+                        </m:ctrlPr>
+                      </m:sSubPr>
+                      <m:e>
+                        <m:r>
+                          <a:rPr lang="de-DE" i="1">
+                            <a:latin typeface="Cambria Math"/>
+                          </a:rPr>
+                          <m:t>𝑆</m:t>
+                        </m:r>
+                      </m:e>
+                      <m:sub>
+                        <m:r>
+                          <a:rPr lang="de-DE" i="1">
+                            <a:latin typeface="Cambria Math"/>
+                          </a:rPr>
+                          <m:t>𝑏𝑖𝑛𝑔</m:t>
+                        </m:r>
+                      </m:sub>
+                    </m:sSub>
+                  </m:oMath>
+                </a14:m>
+                <a:r>
+                  <a:rPr lang="de-DE" dirty="0"/>
+                  <a:t> </a:t>
+                </a:r>
+                <a:r>
+                  <a:rPr lang="de-DE" dirty="0" smtClean="0"/>
+                  <a:t>= 3.370.000.000		</a:t>
+                </a:r>
+                <a:r>
+                  <a:rPr lang="de-DE" dirty="0"/>
+                  <a:t> </a:t>
+                </a:r>
+                <a14:m>
+                  <m:oMath xmlns:m="http://schemas.openxmlformats.org/officeDocument/2006/math">
+                    <m:sSub>
+                      <m:sSubPr>
+                        <m:ctrlPr>
+                          <a:rPr lang="de-DE" i="1">
+                            <a:latin typeface="Cambria Math"/>
+                          </a:rPr>
+                        </m:ctrlPr>
+                      </m:sSubPr>
+                      <m:e>
+                        <m:r>
+                          <a:rPr lang="de-DE" i="1">
+                            <a:latin typeface="Cambria Math"/>
+                          </a:rPr>
+                          <m:t>𝑛</m:t>
+                        </m:r>
+                      </m:e>
+                      <m:sub>
+                        <m:r>
+                          <a:rPr lang="de-DE" i="1">
+                            <a:latin typeface="Cambria Math"/>
+                          </a:rPr>
+                          <m:t>𝑏𝑖𝑛𝑔</m:t>
+                        </m:r>
+                      </m:sub>
+                    </m:sSub>
+                  </m:oMath>
+                </a14:m>
+                <a:r>
+                  <a:rPr lang="de-DE" dirty="0"/>
+                  <a:t>= </a:t>
+                </a:r>
+                <a:r>
+                  <a:rPr lang="de-DE" dirty="0" smtClean="0"/>
+                  <a:t>98</a:t>
+                </a:r>
+                <a:r>
+                  <a:rPr lang="de-DE" dirty="0" smtClean="0"/>
+                  <a:t> </a:t>
+                </a:r>
+                <a:endParaRPr lang="de-DE" dirty="0"/>
+              </a:p>
+              <a:p>
+                <a:endParaRPr lang="de-DE" b="0" i="1" dirty="0" smtClean="0">
+                  <a:latin typeface="Cambria Math"/>
+                </a:endParaRPr>
+              </a:p>
+              <a:p>
+                <a:r>
+                  <a:rPr lang="de-DE" dirty="0" smtClean="0"/>
+                  <a:t>Gemeinsame </a:t>
+                </a:r>
+                <a:r>
+                  <a:rPr lang="de-DE" dirty="0"/>
+                  <a:t>Treffer</a:t>
+                </a:r>
+                <a:r>
+                  <a:rPr lang="de-DE" dirty="0" smtClean="0"/>
+                  <a:t>:		</a:t>
+                </a:r>
+                <a14:m>
+                  <m:oMath xmlns:m="http://schemas.openxmlformats.org/officeDocument/2006/math">
+                    <m:sSub>
+                      <m:sSubPr>
+                        <m:ctrlPr>
+                          <a:rPr lang="de-DE" i="1">
+                            <a:latin typeface="Cambria Math"/>
+                          </a:rPr>
+                        </m:ctrlPr>
+                      </m:sSubPr>
+                      <m:e>
+                        <m:r>
+                          <a:rPr lang="de-DE" i="1">
+                            <a:latin typeface="Cambria Math"/>
+                          </a:rPr>
+                          <m:t>𝑛</m:t>
+                        </m:r>
+                      </m:e>
+                      <m:sub>
+                        <m:r>
+                          <a:rPr lang="de-DE" i="1">
+                            <a:latin typeface="Cambria Math"/>
+                          </a:rPr>
+                          <m:t>0</m:t>
+                        </m:r>
+                      </m:sub>
+                    </m:sSub>
+                  </m:oMath>
+                </a14:m>
+                <a:r>
+                  <a:rPr lang="de-DE" dirty="0"/>
+                  <a:t>= </a:t>
+                </a:r>
+                <a:r>
+                  <a:rPr lang="de-DE" dirty="0" smtClean="0"/>
+                  <a:t>1</a:t>
+                </a:r>
+                <a:endParaRPr lang="de-DE" dirty="0" smtClean="0"/>
+              </a:p>
+              <a:p>
+                <a:endParaRPr lang="de-DE" dirty="0" smtClean="0"/>
+              </a:p>
+              <a:p>
+                <a:r>
+                  <a:rPr lang="de-DE" dirty="0" smtClean="0"/>
+                  <a:t>Abschätzung der Größe des Webs:</a:t>
+                </a:r>
+              </a:p>
+              <a:p>
+                <a:endParaRPr lang="de-DE" dirty="0" smtClean="0"/>
+              </a:p>
+              <a:p>
+                <a:pPr/>
+                <a14:m>
+                  <m:oMathPara xmlns:m="http://schemas.openxmlformats.org/officeDocument/2006/math">
+                    <m:oMathParaPr>
+                      <m:jc m:val="centerGroup"/>
+                    </m:oMathParaPr>
+                    <m:oMath xmlns:m="http://schemas.openxmlformats.org/officeDocument/2006/math">
+                      <m:r>
+                        <a:rPr lang="de-DE" b="0" i="1" smtClean="0">
+                          <a:latin typeface="Cambria Math"/>
+                          <a:ea typeface="Cambria Math"/>
+                        </a:rPr>
+                        <m:t>𝑁</m:t>
+                      </m:r>
+                      <m:r>
+                        <a:rPr lang="de-DE" b="0" i="1" smtClean="0">
+                          <a:latin typeface="Cambria Math"/>
+                          <a:ea typeface="Cambria Math"/>
+                        </a:rPr>
+                        <m:t>≈</m:t>
+                      </m:r>
+                      <m:sSub>
+                        <m:sSubPr>
+                          <m:ctrlPr>
+                            <a:rPr lang="de-DE" b="0" i="1" smtClean="0">
+                              <a:latin typeface="Cambria Math"/>
+                              <a:ea typeface="Cambria Math"/>
+                            </a:rPr>
+                          </m:ctrlPr>
+                        </m:sSubPr>
+                        <m:e>
+                          <m:r>
+                            <a:rPr lang="de-DE" b="0" i="1" smtClean="0">
+                              <a:latin typeface="Cambria Math"/>
+                              <a:ea typeface="Cambria Math"/>
+                            </a:rPr>
+                            <m:t>𝑆</m:t>
+                          </m:r>
+                        </m:e>
+                        <m:sub>
+                          <m:r>
+                            <a:rPr lang="de-DE" b="0" i="1" smtClean="0">
+                              <a:latin typeface="Cambria Math"/>
+                              <a:ea typeface="Cambria Math"/>
+                            </a:rPr>
+                            <m:t>𝑔𝑜𝑜𝑔𝑙𝑒</m:t>
+                          </m:r>
+                        </m:sub>
+                      </m:sSub>
+                      <m:f>
+                        <m:fPr>
+                          <m:ctrlPr>
+                            <a:rPr lang="de-DE" b="0" i="1" smtClean="0">
+                              <a:latin typeface="Cambria Math"/>
+                              <a:ea typeface="Cambria Math"/>
+                            </a:rPr>
+                          </m:ctrlPr>
+                        </m:fPr>
+                        <m:num>
+                          <m:sSub>
+                            <m:sSubPr>
+                              <m:ctrlPr>
+                                <a:rPr lang="de-DE" b="0" i="1" smtClean="0">
+                                  <a:latin typeface="Cambria Math"/>
+                                  <a:ea typeface="Cambria Math"/>
+                                </a:rPr>
+                              </m:ctrlPr>
+                            </m:sSubPr>
+                            <m:e>
+                              <m:r>
+                                <a:rPr lang="de-DE" b="0" i="1" smtClean="0">
+                                  <a:latin typeface="Cambria Math"/>
+                                  <a:ea typeface="Cambria Math"/>
+                                </a:rPr>
+                                <m:t>𝑛</m:t>
+                              </m:r>
+                            </m:e>
+                            <m:sub>
+                              <m:r>
+                                <a:rPr lang="de-DE" b="0" i="1" smtClean="0">
+                                  <a:latin typeface="Cambria Math"/>
+                                  <a:ea typeface="Cambria Math"/>
+                                </a:rPr>
+                                <m:t>𝑏𝑖𝑛𝑔</m:t>
+                              </m:r>
+                            </m:sub>
+                          </m:sSub>
+                        </m:num>
+                        <m:den>
+                          <m:sSub>
+                            <m:sSubPr>
+                              <m:ctrlPr>
+                                <a:rPr lang="de-DE" b="0" i="1" smtClean="0">
+                                  <a:latin typeface="Cambria Math"/>
+                                  <a:ea typeface="Cambria Math"/>
+                                </a:rPr>
+                              </m:ctrlPr>
+                            </m:sSubPr>
+                            <m:e>
+                              <m:r>
+                                <a:rPr lang="de-DE" b="0" i="1" smtClean="0">
+                                  <a:latin typeface="Cambria Math"/>
+                                  <a:ea typeface="Cambria Math"/>
+                                </a:rPr>
+                                <m:t>𝑛</m:t>
+                              </m:r>
+                            </m:e>
+                            <m:sub>
+                              <m:r>
+                                <a:rPr lang="de-DE" b="0" i="1" smtClean="0">
+                                  <a:latin typeface="Cambria Math"/>
+                                  <a:ea typeface="Cambria Math"/>
+                                </a:rPr>
+                                <m:t>0</m:t>
+                              </m:r>
+                            </m:sub>
+                          </m:sSub>
+                        </m:den>
+                      </m:f>
+                      <m:r>
+                        <a:rPr lang="de-DE" b="0" i="1" smtClean="0">
+                          <a:latin typeface="Cambria Math"/>
+                          <a:ea typeface="Cambria Math"/>
+                        </a:rPr>
+                        <m:t>≈</m:t>
+                      </m:r>
+                      <m:sSub>
+                        <m:sSubPr>
+                          <m:ctrlPr>
+                            <a:rPr lang="de-DE" b="0" i="1" smtClean="0">
+                              <a:latin typeface="Cambria Math"/>
+                              <a:ea typeface="Cambria Math"/>
+                            </a:rPr>
+                          </m:ctrlPr>
+                        </m:sSubPr>
+                        <m:e>
+                          <m:r>
+                            <a:rPr lang="de-DE" b="0" i="1" smtClean="0">
+                              <a:latin typeface="Cambria Math"/>
+                              <a:ea typeface="Cambria Math"/>
+                            </a:rPr>
+                            <m:t>𝑆</m:t>
+                          </m:r>
+                        </m:e>
+                        <m:sub>
+                          <m:r>
+                            <a:rPr lang="de-DE" b="0" i="1" smtClean="0">
+                              <a:latin typeface="Cambria Math"/>
+                              <a:ea typeface="Cambria Math"/>
+                            </a:rPr>
+                            <m:t>𝑏𝑖𝑛𝑔</m:t>
+                          </m:r>
+                        </m:sub>
+                      </m:sSub>
+                      <m:f>
+                        <m:fPr>
+                          <m:ctrlPr>
+                            <a:rPr lang="de-DE" b="0" i="1" smtClean="0">
+                              <a:latin typeface="Cambria Math"/>
+                              <a:ea typeface="Cambria Math"/>
+                            </a:rPr>
+                          </m:ctrlPr>
+                        </m:fPr>
+                        <m:num>
+                          <m:sSub>
+                            <m:sSubPr>
+                              <m:ctrlPr>
+                                <a:rPr lang="de-DE" b="0" i="1" smtClean="0">
+                                  <a:latin typeface="Cambria Math"/>
+                                  <a:ea typeface="Cambria Math"/>
+                                </a:rPr>
+                              </m:ctrlPr>
+                            </m:sSubPr>
+                            <m:e>
+                              <m:r>
+                                <a:rPr lang="de-DE" b="0" i="1" smtClean="0">
+                                  <a:latin typeface="Cambria Math"/>
+                                  <a:ea typeface="Cambria Math"/>
+                                </a:rPr>
+                                <m:t>𝑛</m:t>
+                              </m:r>
+                            </m:e>
+                            <m:sub>
+                              <m:r>
+                                <a:rPr lang="de-DE" b="0" i="1" smtClean="0">
+                                  <a:latin typeface="Cambria Math"/>
+                                  <a:ea typeface="Cambria Math"/>
+                                </a:rPr>
+                                <m:t>𝑔𝑜𝑜𝑔𝑙𝑒</m:t>
+                              </m:r>
+                            </m:sub>
+                          </m:sSub>
+                        </m:num>
+                        <m:den>
+                          <m:sSub>
+                            <m:sSubPr>
+                              <m:ctrlPr>
+                                <a:rPr lang="de-DE" b="0" i="1" smtClean="0">
+                                  <a:latin typeface="Cambria Math"/>
+                                  <a:ea typeface="Cambria Math"/>
+                                </a:rPr>
+                              </m:ctrlPr>
+                            </m:sSubPr>
+                            <m:e>
+                              <m:r>
+                                <a:rPr lang="de-DE" b="0" i="1" smtClean="0">
+                                  <a:latin typeface="Cambria Math"/>
+                                  <a:ea typeface="Cambria Math"/>
+                                </a:rPr>
+                                <m:t>𝑛</m:t>
+                              </m:r>
+                            </m:e>
+                            <m:sub>
+                              <m:r>
+                                <a:rPr lang="de-DE" b="0" i="1" smtClean="0">
+                                  <a:latin typeface="Cambria Math"/>
+                                  <a:ea typeface="Cambria Math"/>
+                                </a:rPr>
+                                <m:t>0</m:t>
+                              </m:r>
+                            </m:sub>
+                          </m:sSub>
+                        </m:den>
+                      </m:f>
+                    </m:oMath>
+                  </m:oMathPara>
+                </a14:m>
+                <a:endParaRPr lang="de-DE" dirty="0" smtClean="0"/>
+              </a:p>
+              <a:p>
+                <a:pPr/>
+                <a14:m>
+                  <m:oMathPara xmlns:m="http://schemas.openxmlformats.org/officeDocument/2006/math">
+                    <m:oMathParaPr>
+                      <m:jc m:val="centerGroup"/>
+                    </m:oMathParaPr>
+                    <m:oMath xmlns:m="http://schemas.openxmlformats.org/officeDocument/2006/math">
+                      <m:r>
+                        <a:rPr lang="de-DE" b="0" i="1" smtClean="0">
+                          <a:latin typeface="Cambria Math"/>
+                          <a:ea typeface="Cambria Math"/>
+                        </a:rPr>
+                        <m:t>𝑁</m:t>
+                      </m:r>
+                      <m:r>
+                        <a:rPr lang="de-DE" b="0" i="1" smtClean="0">
+                          <a:latin typeface="Cambria Math"/>
+                          <a:ea typeface="Cambria Math"/>
+                        </a:rPr>
+                        <m:t>≈4.250.000.000∙</m:t>
+                      </m:r>
+                      <m:f>
+                        <m:fPr>
+                          <m:ctrlPr>
+                            <a:rPr lang="de-DE" b="0" i="1" smtClean="0">
+                              <a:latin typeface="Cambria Math"/>
+                              <a:ea typeface="Cambria Math"/>
+                            </a:rPr>
+                          </m:ctrlPr>
+                        </m:fPr>
+                        <m:num>
+                          <m:r>
+                            <a:rPr lang="de-DE" b="0" i="1" smtClean="0">
+                              <a:latin typeface="Cambria Math"/>
+                              <a:ea typeface="Cambria Math"/>
+                            </a:rPr>
+                            <m:t>98</m:t>
+                          </m:r>
+                        </m:num>
+                        <m:den>
+                          <m:r>
+                            <a:rPr lang="de-DE" b="0" i="1" smtClean="0">
+                              <a:latin typeface="Cambria Math"/>
+                              <a:ea typeface="Cambria Math"/>
+                            </a:rPr>
+                            <m:t>1</m:t>
+                          </m:r>
+                        </m:den>
+                      </m:f>
+                    </m:oMath>
+                  </m:oMathPara>
+                </a14:m>
+                <a:endParaRPr lang="de-DE" dirty="0" smtClean="0"/>
+              </a:p>
+              <a:p>
+                <a:pPr/>
+                <a14:m>
+                  <m:oMath xmlns:m="http://schemas.openxmlformats.org/officeDocument/2006/math">
+                    <m:r>
+                      <a:rPr lang="de-DE" b="0" i="1" smtClean="0">
+                        <a:latin typeface="Cambria Math"/>
+                        <a:ea typeface="Cambria Math"/>
+                      </a:rPr>
+                      <m:t>𝑁</m:t>
+                    </m:r>
+                    <m:r>
+                      <a:rPr lang="de-DE" b="0" i="1" smtClean="0">
+                        <a:latin typeface="Cambria Math"/>
+                        <a:ea typeface="Cambria Math"/>
+                      </a:rPr>
+                      <m:t>≈5.553.000.000</m:t>
+                    </m:r>
+                  </m:oMath>
+                </a14:m>
+                <a:r>
+                  <a:rPr lang="de-DE" dirty="0" smtClean="0"/>
+                  <a:t> &lt;&lt;ERGEBNIS STIMMT NATÜRLICH NICHT</a:t>
+                </a:r>
+                <a:endParaRPr lang="de-DE" dirty="0"/>
+              </a:p>
+              <a:p>
+                <a:pPr/>
+                <a:r>
+                  <a:rPr lang="de-DE" dirty="0" smtClean="0"/>
+                  <a:t>Diese Abschätzung erscheint realistisch, Indexedweb.org schätzt die Größe des von Google indexierten Webs auf etwa 47 Milliarden Seiten. Demnach ergeb</a:t>
+                </a:r>
+                <a:r>
+                  <a:rPr lang="de-DE" dirty="0" smtClean="0"/>
+                  <a:t>en die deutschen Seiten mit 5,55 Milliarden einen Anteil von etwa 11,8%.</a:t>
+                </a:r>
+                <a:endParaRPr lang="de-DE" dirty="0" smtClean="0"/>
+              </a:p>
+              <a:p>
+                <a:pPr/>
+                <a:endParaRPr lang="de-DE" dirty="0"/>
+              </a:p>
+              <a:p>
+                <a:endParaRPr lang="de-DE" dirty="0"/>
+              </a:p>
+              <a:p>
+                <a:endParaRPr lang="de-DE" dirty="0" smtClean="0"/>
+              </a:p>
+              <a:p>
+                <a:endParaRPr lang="de-DE" dirty="0"/>
+              </a:p>
+            </p:txBody>
+          </p:sp>
+        </mc:Choice>
+        <mc:Fallback>
+          <p:sp>
+            <p:nvSpPr>
+              <p:cNvPr id="3" name="Textfeld 2"/>
+              <p:cNvSpPr txBox="1">
+                <a:spLocks noRot="1" noChangeAspect="1" noMove="1" noResize="1" noEditPoints="1" noAdjustHandles="1" noChangeArrowheads="1" noChangeShapeType="1" noTextEdit="1"/>
+              </p:cNvSpPr>
+              <p:nvPr/>
+            </p:nvSpPr>
+            <p:spPr>
+              <a:xfrm>
+                <a:off x="465512" y="1459724"/>
+                <a:ext cx="8212975" cy="5342553"/>
+              </a:xfrm>
+              <a:prstGeom prst="rect">
+                <a:avLst/>
+              </a:prstGeom>
+              <a:blipFill rotWithShape="1">
+                <a:blip r:embed="rId4"/>
+                <a:stretch>
+                  <a:fillRect l="-593" t="-456"/>
+                </a:stretch>
+              </a:blipFill>
+            </p:spPr>
+            <p:txBody>
+              <a:bodyPr/>
+              <a:lstStyle/>
+              <a:p>
+                <a:r>
+                  <a:rPr lang="de-DE">
+                    <a:noFill/>
+                  </a:rPr>
+                  <a:t> </a:t>
+                </a:r>
+              </a:p>
+            </p:txBody>
+          </p:sp>
+        </mc:Fallback>
+      </mc:AlternateContent>
+      <p:sp>
+        <p:nvSpPr>
+          <p:cNvPr id="2" name="Foliennummernplatzhalter 1"/>
+          <p:cNvSpPr>
+            <a:spLocks noGrp="1"/>
+          </p:cNvSpPr>
+          <p:nvPr>
+            <p:ph type="sldNum" sz="quarter" idx="12"/>
+          </p:nvPr>
+        </p:nvSpPr>
+        <p:spPr/>
+        <p:txBody>
+          <a:bodyPr/>
+          <a:lstStyle/>
+          <a:p>
+            <a:fld id="{2330A4B3-4A2D-41F8-ABB6-3A93FC7C65B9}" type="slidenum">
+              <a:rPr lang="de-DE" smtClean="0"/>
+              <a:t>6</a:t>
+            </a:fld>
+            <a:endParaRPr lang="de-DE" dirty="0"/>
+          </a:p>
+        </p:txBody>
+      </p:sp>
+    </p:spTree>
+    <p:extLst>
+      <p:ext uri="{BB962C8B-B14F-4D97-AF65-F5344CB8AC3E}">
+        <p14:creationId xmlns:p14="http://schemas.microsoft.com/office/powerpoint/2010/main" val="1576774744"/>
       </p:ext>
     </p:extLst>
   </p:cSld>

</xml_diff>